<commit_message>
update HiFive1 source and document
</commit_message>
<xml_diff>
--- a/Documents/How to build HiFive1 demo using Freefom Studio.pptx
+++ b/Documents/How to build HiFive1 demo using Freefom Studio.pptx
@@ -6,13 +6,21 @@
   </p:sldMasterIdLst>
   <p:sldIdLst>
     <p:sldId id="256" r:id="rId2"/>
-    <p:sldId id="257" r:id="rId3"/>
-    <p:sldId id="258" r:id="rId4"/>
-    <p:sldId id="260" r:id="rId5"/>
-    <p:sldId id="261" r:id="rId6"/>
-    <p:sldId id="262" r:id="rId7"/>
-    <p:sldId id="263" r:id="rId8"/>
-    <p:sldId id="264" r:id="rId9"/>
+    <p:sldId id="268" r:id="rId3"/>
+    <p:sldId id="257" r:id="rId4"/>
+    <p:sldId id="271" r:id="rId5"/>
+    <p:sldId id="258" r:id="rId6"/>
+    <p:sldId id="260" r:id="rId7"/>
+    <p:sldId id="269" r:id="rId8"/>
+    <p:sldId id="270" r:id="rId9"/>
+    <p:sldId id="261" r:id="rId10"/>
+    <p:sldId id="262" r:id="rId11"/>
+    <p:sldId id="267" r:id="rId12"/>
+    <p:sldId id="266" r:id="rId13"/>
+    <p:sldId id="265" r:id="rId14"/>
+    <p:sldId id="263" r:id="rId15"/>
+    <p:sldId id="264" r:id="rId16"/>
+    <p:sldId id="272" r:id="rId17"/>
   </p:sldIdLst>
   <p:sldSz cx="12192000" cy="6858000"/>
   <p:notesSz cx="6858000" cy="9144000"/>
@@ -111,6 +119,11 @@
       </a:defRPr>
     </a:lvl9pPr>
   </p:defaultTextStyle>
+  <p:extLst>
+    <p:ext uri="{EFAFB233-063F-42B5-8137-9DF3F51BA10A}">
+      <p15:sldGuideLst xmlns:p15="http://schemas.microsoft.com/office/powerpoint/2012/main"/>
+    </p:ext>
+  </p:extLst>
 </p:presentation>
 </file>
 
@@ -261,7 +274,7 @@
           <a:p>
             <a:fld id="{52E559F9-57FE-454A-83C2-3BAAD508FED5}" type="datetimeFigureOut">
               <a:rPr lang="en-US" smtClean="0"/>
-              <a:t>11/11/2019</a:t>
+              <a:t>11/20/2019</a:t>
             </a:fld>
             <a:endParaRPr lang="en-US"/>
           </a:p>
@@ -459,7 +472,7 @@
           <a:p>
             <a:fld id="{52E559F9-57FE-454A-83C2-3BAAD508FED5}" type="datetimeFigureOut">
               <a:rPr lang="en-US" smtClean="0"/>
-              <a:t>11/11/2019</a:t>
+              <a:t>11/20/2019</a:t>
             </a:fld>
             <a:endParaRPr lang="en-US"/>
           </a:p>
@@ -667,7 +680,7 @@
           <a:p>
             <a:fld id="{52E559F9-57FE-454A-83C2-3BAAD508FED5}" type="datetimeFigureOut">
               <a:rPr lang="en-US" smtClean="0"/>
-              <a:t>11/11/2019</a:t>
+              <a:t>11/20/2019</a:t>
             </a:fld>
             <a:endParaRPr lang="en-US"/>
           </a:p>
@@ -865,7 +878,7 @@
           <a:p>
             <a:fld id="{52E559F9-57FE-454A-83C2-3BAAD508FED5}" type="datetimeFigureOut">
               <a:rPr lang="en-US" smtClean="0"/>
-              <a:t>11/11/2019</a:t>
+              <a:t>11/20/2019</a:t>
             </a:fld>
             <a:endParaRPr lang="en-US"/>
           </a:p>
@@ -1140,7 +1153,7 @@
           <a:p>
             <a:fld id="{52E559F9-57FE-454A-83C2-3BAAD508FED5}" type="datetimeFigureOut">
               <a:rPr lang="en-US" smtClean="0"/>
-              <a:t>11/11/2019</a:t>
+              <a:t>11/20/2019</a:t>
             </a:fld>
             <a:endParaRPr lang="en-US"/>
           </a:p>
@@ -1405,7 +1418,7 @@
           <a:p>
             <a:fld id="{52E559F9-57FE-454A-83C2-3BAAD508FED5}" type="datetimeFigureOut">
               <a:rPr lang="en-US" smtClean="0"/>
-              <a:t>11/11/2019</a:t>
+              <a:t>11/20/2019</a:t>
             </a:fld>
             <a:endParaRPr lang="en-US"/>
           </a:p>
@@ -1817,7 +1830,7 @@
           <a:p>
             <a:fld id="{52E559F9-57FE-454A-83C2-3BAAD508FED5}" type="datetimeFigureOut">
               <a:rPr lang="en-US" smtClean="0"/>
-              <a:t>11/11/2019</a:t>
+              <a:t>11/20/2019</a:t>
             </a:fld>
             <a:endParaRPr lang="en-US"/>
           </a:p>
@@ -1958,7 +1971,7 @@
           <a:p>
             <a:fld id="{52E559F9-57FE-454A-83C2-3BAAD508FED5}" type="datetimeFigureOut">
               <a:rPr lang="en-US" smtClean="0"/>
-              <a:t>11/11/2019</a:t>
+              <a:t>11/20/2019</a:t>
             </a:fld>
             <a:endParaRPr lang="en-US"/>
           </a:p>
@@ -2071,7 +2084,7 @@
           <a:p>
             <a:fld id="{52E559F9-57FE-454A-83C2-3BAAD508FED5}" type="datetimeFigureOut">
               <a:rPr lang="en-US" smtClean="0"/>
-              <a:t>11/11/2019</a:t>
+              <a:t>11/20/2019</a:t>
             </a:fld>
             <a:endParaRPr lang="en-US"/>
           </a:p>
@@ -2382,7 +2395,7 @@
           <a:p>
             <a:fld id="{52E559F9-57FE-454A-83C2-3BAAD508FED5}" type="datetimeFigureOut">
               <a:rPr lang="en-US" smtClean="0"/>
-              <a:t>11/11/2019</a:t>
+              <a:t>11/20/2019</a:t>
             </a:fld>
             <a:endParaRPr lang="en-US"/>
           </a:p>
@@ -2670,7 +2683,7 @@
           <a:p>
             <a:fld id="{52E559F9-57FE-454A-83C2-3BAAD508FED5}" type="datetimeFigureOut">
               <a:rPr lang="en-US" smtClean="0"/>
-              <a:t>11/11/2019</a:t>
+              <a:t>11/20/2019</a:t>
             </a:fld>
             <a:endParaRPr lang="en-US"/>
           </a:p>
@@ -2911,7 +2924,7 @@
           <a:p>
             <a:fld id="{52E559F9-57FE-454A-83C2-3BAAD508FED5}" type="datetimeFigureOut">
               <a:rPr lang="en-US" smtClean="0"/>
-              <a:t>11/11/2019</a:t>
+              <a:t>11/20/2019</a:t>
             </a:fld>
             <a:endParaRPr lang="en-US"/>
           </a:p>
@@ -3433,7 +3446,7 @@
           <a:p>
             <a:r>
               <a:rPr lang="en-US" dirty="0"/>
-              <a:t>Nov-11-2019</a:t>
+              <a:t>Nov-19-2019 </a:t>
             </a:r>
           </a:p>
         </p:txBody>
@@ -3442,6 +3455,1183 @@
     <p:extLst>
       <p:ext uri="{BB962C8B-B14F-4D97-AF65-F5344CB8AC3E}">
         <p14:creationId xmlns:p14="http://schemas.microsoft.com/office/powerpoint/2010/main" val="3180739828"/>
+      </p:ext>
+    </p:extLst>
+  </p:cSld>
+  <p:clrMapOvr>
+    <a:masterClrMapping/>
+  </p:clrMapOvr>
+</p:sld>
+</file>
+
+<file path=ppt/slides/slide10.xml><?xml version="1.0" encoding="utf-8"?>
+<p:sld xmlns:a="http://schemas.openxmlformats.org/drawingml/2006/main" xmlns:r="http://schemas.openxmlformats.org/officeDocument/2006/relationships" xmlns:p="http://schemas.openxmlformats.org/presentationml/2006/main">
+  <p:cSld>
+    <p:spTree>
+      <p:nvGrpSpPr>
+        <p:cNvPr id="1" name=""/>
+        <p:cNvGrpSpPr/>
+        <p:nvPr/>
+      </p:nvGrpSpPr>
+      <p:grpSpPr>
+        <a:xfrm>
+          <a:off x="0" y="0"/>
+          <a:ext cx="0" cy="0"/>
+          <a:chOff x="0" y="0"/>
+          <a:chExt cx="0" cy="0"/>
+        </a:xfrm>
+      </p:grpSpPr>
+      <p:pic>
+        <p:nvPicPr>
+          <p:cNvPr id="6" name="Picture 5">
+            <a:extLst>
+              <a:ext uri="{FF2B5EF4-FFF2-40B4-BE49-F238E27FC236}">
+                <a16:creationId xmlns:a16="http://schemas.microsoft.com/office/drawing/2014/main" id="{430BA772-63C2-4D23-8F95-9AE49FE83508}"/>
+              </a:ext>
+            </a:extLst>
+          </p:cNvPr>
+          <p:cNvPicPr>
+            <a:picLocks noChangeAspect="1"/>
+          </p:cNvPicPr>
+          <p:nvPr/>
+        </p:nvPicPr>
+        <p:blipFill>
+          <a:blip r:embed="rId2"/>
+          <a:stretch>
+            <a:fillRect/>
+          </a:stretch>
+        </p:blipFill>
+        <p:spPr>
+          <a:xfrm>
+            <a:off x="7560412" y="1334879"/>
+            <a:ext cx="4190085" cy="3362743"/>
+          </a:xfrm>
+          <a:prstGeom prst="rect">
+            <a:avLst/>
+          </a:prstGeom>
+        </p:spPr>
+      </p:pic>
+      <p:sp>
+        <p:nvSpPr>
+          <p:cNvPr id="2" name="Title 1">
+            <a:extLst>
+              <a:ext uri="{FF2B5EF4-FFF2-40B4-BE49-F238E27FC236}">
+                <a16:creationId xmlns:a16="http://schemas.microsoft.com/office/drawing/2014/main" id="{5839C894-CD14-4B91-9815-C35F6F846CE9}"/>
+              </a:ext>
+            </a:extLst>
+          </p:cNvPr>
+          <p:cNvSpPr>
+            <a:spLocks noGrp="1"/>
+          </p:cNvSpPr>
+          <p:nvPr>
+            <p:ph type="title"/>
+          </p:nvPr>
+        </p:nvSpPr>
+        <p:spPr/>
+        <p:txBody>
+          <a:bodyPr/>
+          <a:lstStyle/>
+          <a:p>
+            <a:r>
+              <a:rPr lang="en-US" dirty="0"/>
+              <a:t>Add new debug configuration</a:t>
+            </a:r>
+          </a:p>
+        </p:txBody>
+      </p:sp>
+      <p:sp>
+        <p:nvSpPr>
+          <p:cNvPr id="3" name="Content Placeholder 2">
+            <a:extLst>
+              <a:ext uri="{FF2B5EF4-FFF2-40B4-BE49-F238E27FC236}">
+                <a16:creationId xmlns:a16="http://schemas.microsoft.com/office/drawing/2014/main" id="{4941DB49-E741-4F16-B6A6-31B8B0472600}"/>
+              </a:ext>
+            </a:extLst>
+          </p:cNvPr>
+          <p:cNvSpPr>
+            <a:spLocks noGrp="1"/>
+          </p:cNvSpPr>
+          <p:nvPr>
+            <p:ph idx="1"/>
+          </p:nvPr>
+        </p:nvSpPr>
+        <p:spPr>
+          <a:xfrm>
+            <a:off x="838200" y="1459865"/>
+            <a:ext cx="6477000" cy="4351338"/>
+          </a:xfrm>
+        </p:spPr>
+        <p:txBody>
+          <a:bodyPr>
+            <a:normAutofit/>
+          </a:bodyPr>
+          <a:lstStyle/>
+          <a:p>
+            <a:r>
+              <a:rPr lang="en-US" sz="1400" dirty="0"/>
+              <a:t>After building finished, connect HiFive1 board to your PC</a:t>
+            </a:r>
+          </a:p>
+          <a:p>
+            <a:r>
+              <a:rPr lang="en-US" sz="1400" dirty="0"/>
+              <a:t>Right click to project, select </a:t>
+            </a:r>
+            <a:r>
+              <a:rPr lang="en-US" sz="1400" b="1" dirty="0"/>
+              <a:t>Debug As &gt; Debug Configurations …</a:t>
+            </a:r>
+          </a:p>
+          <a:p>
+            <a:r>
+              <a:rPr lang="en-US" sz="1400" dirty="0"/>
+              <a:t>In </a:t>
+            </a:r>
+            <a:r>
+              <a:rPr lang="en-US" sz="1400" b="1" dirty="0"/>
+              <a:t>Debug Configurations</a:t>
+            </a:r>
+            <a:r>
+              <a:rPr lang="en-US" sz="1400" dirty="0"/>
+              <a:t> window, select </a:t>
+            </a:r>
+            <a:r>
+              <a:rPr lang="en-US" sz="1400" b="1" dirty="0" err="1"/>
+              <a:t>Sifive</a:t>
+            </a:r>
+            <a:r>
+              <a:rPr lang="en-US" sz="1400" b="1" dirty="0"/>
+              <a:t> GDB SEGGER J-Link Debugging</a:t>
+            </a:r>
+          </a:p>
+          <a:p>
+            <a:r>
+              <a:rPr lang="en-US" sz="1400" dirty="0"/>
+              <a:t>Right click and select </a:t>
+            </a:r>
+            <a:r>
+              <a:rPr lang="en-US" sz="1400" b="1" dirty="0"/>
+              <a:t>New Configuration</a:t>
+            </a:r>
+          </a:p>
+          <a:p>
+            <a:endParaRPr lang="en-US" sz="1400" dirty="0"/>
+          </a:p>
+        </p:txBody>
+      </p:sp>
+    </p:spTree>
+    <p:extLst>
+      <p:ext uri="{BB962C8B-B14F-4D97-AF65-F5344CB8AC3E}">
+        <p14:creationId xmlns:p14="http://schemas.microsoft.com/office/powerpoint/2010/main" val="995131544"/>
+      </p:ext>
+    </p:extLst>
+  </p:cSld>
+  <p:clrMapOvr>
+    <a:masterClrMapping/>
+  </p:clrMapOvr>
+</p:sld>
+</file>
+
+<file path=ppt/slides/slide11.xml><?xml version="1.0" encoding="utf-8"?>
+<p:sld xmlns:a="http://schemas.openxmlformats.org/drawingml/2006/main" xmlns:r="http://schemas.openxmlformats.org/officeDocument/2006/relationships" xmlns:p="http://schemas.openxmlformats.org/presentationml/2006/main">
+  <p:cSld>
+    <p:spTree>
+      <p:nvGrpSpPr>
+        <p:cNvPr id="1" name=""/>
+        <p:cNvGrpSpPr/>
+        <p:nvPr/>
+      </p:nvGrpSpPr>
+      <p:grpSpPr>
+        <a:xfrm>
+          <a:off x="0" y="0"/>
+          <a:ext cx="0" cy="0"/>
+          <a:chOff x="0" y="0"/>
+          <a:chExt cx="0" cy="0"/>
+        </a:xfrm>
+      </p:grpSpPr>
+      <p:sp>
+        <p:nvSpPr>
+          <p:cNvPr id="2" name="Title 1">
+            <a:extLst>
+              <a:ext uri="{FF2B5EF4-FFF2-40B4-BE49-F238E27FC236}">
+                <a16:creationId xmlns:a16="http://schemas.microsoft.com/office/drawing/2014/main" id="{93EE9144-744D-4D20-BA9E-726304CA1D11}"/>
+              </a:ext>
+            </a:extLst>
+          </p:cNvPr>
+          <p:cNvSpPr>
+            <a:spLocks noGrp="1"/>
+          </p:cNvSpPr>
+          <p:nvPr>
+            <p:ph type="title"/>
+          </p:nvPr>
+        </p:nvSpPr>
+        <p:spPr/>
+        <p:txBody>
+          <a:bodyPr/>
+          <a:lstStyle/>
+          <a:p>
+            <a:r>
+              <a:rPr lang="en-US" dirty="0"/>
+              <a:t>Debug configurations </a:t>
+            </a:r>
+          </a:p>
+        </p:txBody>
+      </p:sp>
+      <p:sp>
+        <p:nvSpPr>
+          <p:cNvPr id="3" name="Content Placeholder 2">
+            <a:extLst>
+              <a:ext uri="{FF2B5EF4-FFF2-40B4-BE49-F238E27FC236}">
+                <a16:creationId xmlns:a16="http://schemas.microsoft.com/office/drawing/2014/main" id="{30D57EB4-08E5-4DE2-B15A-C826AC03E278}"/>
+              </a:ext>
+            </a:extLst>
+          </p:cNvPr>
+          <p:cNvSpPr>
+            <a:spLocks noGrp="1"/>
+          </p:cNvSpPr>
+          <p:nvPr>
+            <p:ph idx="1"/>
+          </p:nvPr>
+        </p:nvSpPr>
+        <p:spPr>
+          <a:xfrm>
+            <a:off x="838200" y="1825625"/>
+            <a:ext cx="5257800" cy="4351338"/>
+          </a:xfrm>
+        </p:spPr>
+        <p:txBody>
+          <a:bodyPr>
+            <a:normAutofit/>
+          </a:bodyPr>
+          <a:lstStyle/>
+          <a:p>
+            <a:r>
+              <a:rPr lang="en-US" sz="1400" dirty="0"/>
+              <a:t>Project: </a:t>
+            </a:r>
+            <a:r>
+              <a:rPr lang="en-US" sz="1400" b="1" dirty="0" err="1"/>
+              <a:t>RTOSDemo</a:t>
+            </a:r>
+            <a:endParaRPr lang="en-US" sz="1400" b="1" dirty="0"/>
+          </a:p>
+          <a:p>
+            <a:r>
+              <a:rPr lang="en-US" sz="1400" dirty="0"/>
+              <a:t>C/C++ </a:t>
+            </a:r>
+            <a:r>
+              <a:rPr lang="en-US" sz="1400" dirty="0" err="1"/>
+              <a:t>Applicaton</a:t>
+            </a:r>
+            <a:r>
+              <a:rPr lang="en-US" sz="1400" dirty="0"/>
+              <a:t>: </a:t>
+            </a:r>
+            <a:r>
+              <a:rPr lang="en-US" sz="1400" b="1" dirty="0"/>
+              <a:t>Debug\</a:t>
+            </a:r>
+            <a:r>
+              <a:rPr lang="en-US" sz="1400" b="1" dirty="0" err="1"/>
+              <a:t>RTOSDemo</a:t>
+            </a:r>
+            <a:endParaRPr lang="en-US" sz="1400" b="1" dirty="0"/>
+          </a:p>
+        </p:txBody>
+      </p:sp>
+      <p:pic>
+        <p:nvPicPr>
+          <p:cNvPr id="4" name="Picture 3">
+            <a:extLst>
+              <a:ext uri="{FF2B5EF4-FFF2-40B4-BE49-F238E27FC236}">
+                <a16:creationId xmlns:a16="http://schemas.microsoft.com/office/drawing/2014/main" id="{E5207112-D8B2-47B9-8A6F-9B10862602FD}"/>
+              </a:ext>
+            </a:extLst>
+          </p:cNvPr>
+          <p:cNvPicPr>
+            <a:picLocks noChangeAspect="1"/>
+          </p:cNvPicPr>
+          <p:nvPr/>
+        </p:nvPicPr>
+        <p:blipFill>
+          <a:blip r:embed="rId2"/>
+          <a:stretch>
+            <a:fillRect/>
+          </a:stretch>
+        </p:blipFill>
+        <p:spPr>
+          <a:xfrm>
+            <a:off x="6419687" y="1253330"/>
+            <a:ext cx="5528473" cy="4351339"/>
+          </a:xfrm>
+          <a:prstGeom prst="rect">
+            <a:avLst/>
+          </a:prstGeom>
+        </p:spPr>
+      </p:pic>
+    </p:spTree>
+    <p:extLst>
+      <p:ext uri="{BB962C8B-B14F-4D97-AF65-F5344CB8AC3E}">
+        <p14:creationId xmlns:p14="http://schemas.microsoft.com/office/powerpoint/2010/main" val="2161451249"/>
+      </p:ext>
+    </p:extLst>
+  </p:cSld>
+  <p:clrMapOvr>
+    <a:masterClrMapping/>
+  </p:clrMapOvr>
+</p:sld>
+</file>
+
+<file path=ppt/slides/slide12.xml><?xml version="1.0" encoding="utf-8"?>
+<p:sld xmlns:a="http://schemas.openxmlformats.org/drawingml/2006/main" xmlns:r="http://schemas.openxmlformats.org/officeDocument/2006/relationships" xmlns:p="http://schemas.openxmlformats.org/presentationml/2006/main">
+  <p:cSld>
+    <p:spTree>
+      <p:nvGrpSpPr>
+        <p:cNvPr id="1" name=""/>
+        <p:cNvGrpSpPr/>
+        <p:nvPr/>
+      </p:nvGrpSpPr>
+      <p:grpSpPr>
+        <a:xfrm>
+          <a:off x="0" y="0"/>
+          <a:ext cx="0" cy="0"/>
+          <a:chOff x="0" y="0"/>
+          <a:chExt cx="0" cy="0"/>
+        </a:xfrm>
+      </p:grpSpPr>
+      <p:sp>
+        <p:nvSpPr>
+          <p:cNvPr id="2" name="Title 1">
+            <a:extLst>
+              <a:ext uri="{FF2B5EF4-FFF2-40B4-BE49-F238E27FC236}">
+                <a16:creationId xmlns:a16="http://schemas.microsoft.com/office/drawing/2014/main" id="{A6AE2396-2288-4D3E-AA25-43EBE1443A4A}"/>
+              </a:ext>
+            </a:extLst>
+          </p:cNvPr>
+          <p:cNvSpPr>
+            <a:spLocks noGrp="1"/>
+          </p:cNvSpPr>
+          <p:nvPr>
+            <p:ph type="title"/>
+          </p:nvPr>
+        </p:nvSpPr>
+        <p:spPr/>
+        <p:txBody>
+          <a:bodyPr/>
+          <a:lstStyle/>
+          <a:p>
+            <a:r>
+              <a:rPr lang="en-US" dirty="0"/>
+              <a:t>Debug configurations</a:t>
+            </a:r>
+          </a:p>
+        </p:txBody>
+      </p:sp>
+      <p:sp>
+        <p:nvSpPr>
+          <p:cNvPr id="3" name="Content Placeholder 2">
+            <a:extLst>
+              <a:ext uri="{FF2B5EF4-FFF2-40B4-BE49-F238E27FC236}">
+                <a16:creationId xmlns:a16="http://schemas.microsoft.com/office/drawing/2014/main" id="{A79466F1-C07F-4AFA-9365-35A7A3A141CB}"/>
+              </a:ext>
+            </a:extLst>
+          </p:cNvPr>
+          <p:cNvSpPr>
+            <a:spLocks noGrp="1"/>
+          </p:cNvSpPr>
+          <p:nvPr>
+            <p:ph idx="1"/>
+          </p:nvPr>
+        </p:nvSpPr>
+        <p:spPr>
+          <a:xfrm>
+            <a:off x="838200" y="1825625"/>
+            <a:ext cx="4265007" cy="4351338"/>
+          </a:xfrm>
+        </p:spPr>
+        <p:txBody>
+          <a:bodyPr/>
+          <a:lstStyle/>
+          <a:p>
+            <a:r>
+              <a:rPr lang="en-US" sz="1400" dirty="0"/>
+              <a:t>DTS File:  </a:t>
+            </a:r>
+            <a:r>
+              <a:rPr lang="en-US" sz="1400" b="1" dirty="0" err="1"/>
+              <a:t>bsp</a:t>
+            </a:r>
+            <a:r>
+              <a:rPr lang="en-US" sz="1400" b="1" dirty="0"/>
+              <a:t>\</a:t>
+            </a:r>
+            <a:r>
+              <a:rPr lang="en-US" sz="1400" b="1" dirty="0" err="1"/>
+              <a:t>design.dts</a:t>
+            </a:r>
+            <a:endParaRPr lang="en-US" sz="1400" b="1" dirty="0"/>
+          </a:p>
+          <a:p>
+            <a:r>
+              <a:rPr lang="en-US" sz="1400" dirty="0"/>
+              <a:t>Actual path: </a:t>
+            </a:r>
+          </a:p>
+          <a:p>
+            <a:pPr marL="457200" lvl="1" indent="0">
+              <a:buNone/>
+            </a:pPr>
+            <a:r>
+              <a:rPr lang="en-US" sz="1000" dirty="0"/>
+              <a:t>Example:</a:t>
+            </a:r>
+          </a:p>
+          <a:p>
+            <a:pPr lvl="1"/>
+            <a:r>
+              <a:rPr lang="en-US" sz="1000" b="1" dirty="0"/>
+              <a:t>E:\AWS-FreeRTOS-HiFive1\freertos-code-r2752-trunk_SHC_demo\FreeRTOS\Demo\RISC-V_RV32_SiFive_HiFive1_FreedomStudio\bsp\design.dts</a:t>
+            </a:r>
+          </a:p>
+          <a:p>
+            <a:r>
+              <a:rPr lang="en-US" sz="1400" dirty="0"/>
+              <a:t>Selected </a:t>
+            </a:r>
+            <a:r>
+              <a:rPr lang="en-US" sz="1400" dirty="0" err="1"/>
+              <a:t>cpu</a:t>
+            </a:r>
+            <a:r>
+              <a:rPr lang="en-US" sz="1400" dirty="0"/>
+              <a:t>: </a:t>
+            </a:r>
+            <a:r>
+              <a:rPr lang="en-US" sz="1400" b="1" dirty="0"/>
+              <a:t>cpu@0</a:t>
+            </a:r>
+          </a:p>
+        </p:txBody>
+      </p:sp>
+      <p:pic>
+        <p:nvPicPr>
+          <p:cNvPr id="5" name="Picture 4">
+            <a:extLst>
+              <a:ext uri="{FF2B5EF4-FFF2-40B4-BE49-F238E27FC236}">
+                <a16:creationId xmlns:a16="http://schemas.microsoft.com/office/drawing/2014/main" id="{05E98CDE-F3F1-417C-B2CA-9461A9082996}"/>
+              </a:ext>
+            </a:extLst>
+          </p:cNvPr>
+          <p:cNvPicPr>
+            <a:picLocks noChangeAspect="1"/>
+          </p:cNvPicPr>
+          <p:nvPr/>
+        </p:nvPicPr>
+        <p:blipFill>
+          <a:blip r:embed="rId2"/>
+          <a:stretch>
+            <a:fillRect/>
+          </a:stretch>
+        </p:blipFill>
+        <p:spPr>
+          <a:xfrm>
+            <a:off x="5103207" y="1702800"/>
+            <a:ext cx="7073694" cy="3452400"/>
+          </a:xfrm>
+          <a:prstGeom prst="rect">
+            <a:avLst/>
+          </a:prstGeom>
+        </p:spPr>
+      </p:pic>
+    </p:spTree>
+    <p:extLst>
+      <p:ext uri="{BB962C8B-B14F-4D97-AF65-F5344CB8AC3E}">
+        <p14:creationId xmlns:p14="http://schemas.microsoft.com/office/powerpoint/2010/main" val="583826136"/>
+      </p:ext>
+    </p:extLst>
+  </p:cSld>
+  <p:clrMapOvr>
+    <a:masterClrMapping/>
+  </p:clrMapOvr>
+</p:sld>
+</file>
+
+<file path=ppt/slides/slide13.xml><?xml version="1.0" encoding="utf-8"?>
+<p:sld xmlns:a="http://schemas.openxmlformats.org/drawingml/2006/main" xmlns:r="http://schemas.openxmlformats.org/officeDocument/2006/relationships" xmlns:p="http://schemas.openxmlformats.org/presentationml/2006/main">
+  <p:cSld>
+    <p:spTree>
+      <p:nvGrpSpPr>
+        <p:cNvPr id="1" name=""/>
+        <p:cNvGrpSpPr/>
+        <p:nvPr/>
+      </p:nvGrpSpPr>
+      <p:grpSpPr>
+        <a:xfrm>
+          <a:off x="0" y="0"/>
+          <a:ext cx="0" cy="0"/>
+          <a:chOff x="0" y="0"/>
+          <a:chExt cx="0" cy="0"/>
+        </a:xfrm>
+      </p:grpSpPr>
+      <p:pic>
+        <p:nvPicPr>
+          <p:cNvPr id="6" name="Picture 5">
+            <a:extLst>
+              <a:ext uri="{FF2B5EF4-FFF2-40B4-BE49-F238E27FC236}">
+                <a16:creationId xmlns:a16="http://schemas.microsoft.com/office/drawing/2014/main" id="{8425C6AF-C822-46A6-BB04-85CC64637D4A}"/>
+              </a:ext>
+            </a:extLst>
+          </p:cNvPr>
+          <p:cNvPicPr>
+            <a:picLocks noChangeAspect="1"/>
+          </p:cNvPicPr>
+          <p:nvPr/>
+        </p:nvPicPr>
+        <p:blipFill>
+          <a:blip r:embed="rId2"/>
+          <a:stretch>
+            <a:fillRect/>
+          </a:stretch>
+        </p:blipFill>
+        <p:spPr>
+          <a:xfrm>
+            <a:off x="5076287" y="1690688"/>
+            <a:ext cx="7026933" cy="3884489"/>
+          </a:xfrm>
+          <a:prstGeom prst="rect">
+            <a:avLst/>
+          </a:prstGeom>
+        </p:spPr>
+      </p:pic>
+      <p:sp>
+        <p:nvSpPr>
+          <p:cNvPr id="2" name="Title 1">
+            <a:extLst>
+              <a:ext uri="{FF2B5EF4-FFF2-40B4-BE49-F238E27FC236}">
+                <a16:creationId xmlns:a16="http://schemas.microsoft.com/office/drawing/2014/main" id="{FF4FCF4E-B7C4-4D14-B779-D78B230C5D8B}"/>
+              </a:ext>
+            </a:extLst>
+          </p:cNvPr>
+          <p:cNvSpPr>
+            <a:spLocks noGrp="1"/>
+          </p:cNvSpPr>
+          <p:nvPr>
+            <p:ph type="title"/>
+          </p:nvPr>
+        </p:nvSpPr>
+        <p:spPr/>
+        <p:txBody>
+          <a:bodyPr/>
+          <a:lstStyle/>
+          <a:p>
+            <a:r>
+              <a:rPr lang="en-US" dirty="0"/>
+              <a:t>Debug configurations</a:t>
+            </a:r>
+          </a:p>
+        </p:txBody>
+      </p:sp>
+      <p:sp>
+        <p:nvSpPr>
+          <p:cNvPr id="3" name="Content Placeholder 2">
+            <a:extLst>
+              <a:ext uri="{FF2B5EF4-FFF2-40B4-BE49-F238E27FC236}">
+                <a16:creationId xmlns:a16="http://schemas.microsoft.com/office/drawing/2014/main" id="{1583B603-5BA2-42F7-9612-7ECA1D830572}"/>
+              </a:ext>
+            </a:extLst>
+          </p:cNvPr>
+          <p:cNvSpPr>
+            <a:spLocks noGrp="1"/>
+          </p:cNvSpPr>
+          <p:nvPr>
+            <p:ph idx="1"/>
+          </p:nvPr>
+        </p:nvSpPr>
+        <p:spPr>
+          <a:xfrm>
+            <a:off x="838200" y="1825625"/>
+            <a:ext cx="3806398" cy="4351338"/>
+          </a:xfrm>
+        </p:spPr>
+        <p:txBody>
+          <a:bodyPr>
+            <a:normAutofit/>
+          </a:bodyPr>
+          <a:lstStyle/>
+          <a:p>
+            <a:r>
+              <a:rPr lang="en-US" sz="1400" dirty="0"/>
+              <a:t>Device name: </a:t>
+            </a:r>
+            <a:r>
+              <a:rPr lang="en-US" sz="1400" b="1" dirty="0"/>
+              <a:t>FE310</a:t>
+            </a:r>
+          </a:p>
+          <a:p>
+            <a:r>
+              <a:rPr lang="en-US" sz="1400" dirty="0"/>
+              <a:t>Click </a:t>
+            </a:r>
+            <a:r>
+              <a:rPr lang="en-US" sz="1400" b="1" dirty="0"/>
+              <a:t>Debug</a:t>
+            </a:r>
+            <a:r>
+              <a:rPr lang="en-US" sz="1400" dirty="0"/>
+              <a:t> and wait to flash binary on board</a:t>
+            </a:r>
+          </a:p>
+        </p:txBody>
+      </p:sp>
+      <p:sp>
+        <p:nvSpPr>
+          <p:cNvPr id="5" name="Rectangle 4">
+            <a:extLst>
+              <a:ext uri="{FF2B5EF4-FFF2-40B4-BE49-F238E27FC236}">
+                <a16:creationId xmlns:a16="http://schemas.microsoft.com/office/drawing/2014/main" id="{AEC0F8C6-984F-4E24-AAD0-568A3D529383}"/>
+              </a:ext>
+            </a:extLst>
+          </p:cNvPr>
+          <p:cNvSpPr/>
+          <p:nvPr/>
+        </p:nvSpPr>
+        <p:spPr>
+          <a:xfrm>
+            <a:off x="7022235" y="3103331"/>
+            <a:ext cx="1272219" cy="315189"/>
+          </a:xfrm>
+          <a:prstGeom prst="rect">
+            <a:avLst/>
+          </a:prstGeom>
+          <a:noFill/>
+          <a:ln w="38100">
+            <a:solidFill>
+              <a:srgbClr val="FF0000"/>
+            </a:solidFill>
+          </a:ln>
+        </p:spPr>
+        <p:style>
+          <a:lnRef idx="2">
+            <a:schemeClr val="accent1">
+              <a:shade val="50000"/>
+            </a:schemeClr>
+          </a:lnRef>
+          <a:fillRef idx="1">
+            <a:schemeClr val="accent1"/>
+          </a:fillRef>
+          <a:effectRef idx="0">
+            <a:schemeClr val="accent1"/>
+          </a:effectRef>
+          <a:fontRef idx="minor">
+            <a:schemeClr val="lt1"/>
+          </a:fontRef>
+        </p:style>
+        <p:txBody>
+          <a:bodyPr rtlCol="0" anchor="ctr"/>
+          <a:lstStyle/>
+          <a:p>
+            <a:pPr algn="ctr"/>
+            <a:endParaRPr lang="en-US"/>
+          </a:p>
+        </p:txBody>
+      </p:sp>
+    </p:spTree>
+    <p:extLst>
+      <p:ext uri="{BB962C8B-B14F-4D97-AF65-F5344CB8AC3E}">
+        <p14:creationId xmlns:p14="http://schemas.microsoft.com/office/powerpoint/2010/main" val="1321413257"/>
+      </p:ext>
+    </p:extLst>
+  </p:cSld>
+  <p:clrMapOvr>
+    <a:masterClrMapping/>
+  </p:clrMapOvr>
+</p:sld>
+</file>
+
+<file path=ppt/slides/slide14.xml><?xml version="1.0" encoding="utf-8"?>
+<p:sld xmlns:a="http://schemas.openxmlformats.org/drawingml/2006/main" xmlns:r="http://schemas.openxmlformats.org/officeDocument/2006/relationships" xmlns:p="http://schemas.openxmlformats.org/presentationml/2006/main">
+  <p:cSld>
+    <p:spTree>
+      <p:nvGrpSpPr>
+        <p:cNvPr id="1" name=""/>
+        <p:cNvGrpSpPr/>
+        <p:nvPr/>
+      </p:nvGrpSpPr>
+      <p:grpSpPr>
+        <a:xfrm>
+          <a:off x="0" y="0"/>
+          <a:ext cx="0" cy="0"/>
+          <a:chOff x="0" y="0"/>
+          <a:chExt cx="0" cy="0"/>
+        </a:xfrm>
+      </p:grpSpPr>
+      <p:pic>
+        <p:nvPicPr>
+          <p:cNvPr id="8" name="Picture 7">
+            <a:extLst>
+              <a:ext uri="{FF2B5EF4-FFF2-40B4-BE49-F238E27FC236}">
+                <a16:creationId xmlns:a16="http://schemas.microsoft.com/office/drawing/2014/main" id="{E1045E86-EE11-4403-B8C6-E31B7F0B17AE}"/>
+              </a:ext>
+            </a:extLst>
+          </p:cNvPr>
+          <p:cNvPicPr>
+            <a:picLocks noChangeAspect="1"/>
+          </p:cNvPicPr>
+          <p:nvPr/>
+        </p:nvPicPr>
+        <p:blipFill>
+          <a:blip r:embed="rId2"/>
+          <a:stretch>
+            <a:fillRect/>
+          </a:stretch>
+        </p:blipFill>
+        <p:spPr>
+          <a:xfrm>
+            <a:off x="5178242" y="1498580"/>
+            <a:ext cx="6901131" cy="4351338"/>
+          </a:xfrm>
+          <a:prstGeom prst="rect">
+            <a:avLst/>
+          </a:prstGeom>
+        </p:spPr>
+      </p:pic>
+      <p:sp>
+        <p:nvSpPr>
+          <p:cNvPr id="2" name="Title 1">
+            <a:extLst>
+              <a:ext uri="{FF2B5EF4-FFF2-40B4-BE49-F238E27FC236}">
+                <a16:creationId xmlns:a16="http://schemas.microsoft.com/office/drawing/2014/main" id="{21AFE027-AA71-4191-ACD8-860D04401BD7}"/>
+              </a:ext>
+            </a:extLst>
+          </p:cNvPr>
+          <p:cNvSpPr>
+            <a:spLocks noGrp="1"/>
+          </p:cNvSpPr>
+          <p:nvPr>
+            <p:ph type="title"/>
+          </p:nvPr>
+        </p:nvSpPr>
+        <p:spPr/>
+        <p:txBody>
+          <a:bodyPr/>
+          <a:lstStyle/>
+          <a:p>
+            <a:r>
+              <a:rPr lang="en-US" dirty="0"/>
+              <a:t>Run HiFive1 demo</a:t>
+            </a:r>
+          </a:p>
+        </p:txBody>
+      </p:sp>
+      <p:sp>
+        <p:nvSpPr>
+          <p:cNvPr id="3" name="Content Placeholder 2">
+            <a:extLst>
+              <a:ext uri="{FF2B5EF4-FFF2-40B4-BE49-F238E27FC236}">
+                <a16:creationId xmlns:a16="http://schemas.microsoft.com/office/drawing/2014/main" id="{D23E1169-6FD9-48A9-AB29-1D8A5C1B45A6}"/>
+              </a:ext>
+            </a:extLst>
+          </p:cNvPr>
+          <p:cNvSpPr>
+            <a:spLocks noGrp="1"/>
+          </p:cNvSpPr>
+          <p:nvPr>
+            <p:ph idx="1"/>
+          </p:nvPr>
+        </p:nvSpPr>
+        <p:spPr>
+          <a:xfrm>
+            <a:off x="838200" y="1610789"/>
+            <a:ext cx="4461769" cy="4351338"/>
+          </a:xfrm>
+        </p:spPr>
+        <p:txBody>
+          <a:bodyPr>
+            <a:normAutofit/>
+          </a:bodyPr>
+          <a:lstStyle/>
+          <a:p>
+            <a:r>
+              <a:rPr lang="en-US" sz="1400" dirty="0"/>
+              <a:t>Select </a:t>
+            </a:r>
+            <a:r>
+              <a:rPr lang="en-US" sz="1400" b="1" dirty="0"/>
+              <a:t>Terminate</a:t>
+            </a:r>
+            <a:r>
+              <a:rPr lang="en-US" sz="1400" dirty="0"/>
+              <a:t> to stop Debug</a:t>
+            </a:r>
+          </a:p>
+          <a:p>
+            <a:r>
+              <a:rPr lang="en-US" sz="1400" dirty="0"/>
+              <a:t>Press </a:t>
+            </a:r>
+            <a:r>
+              <a:rPr lang="en-US" sz="1400" b="1" dirty="0"/>
+              <a:t>RESET</a:t>
+            </a:r>
+            <a:r>
+              <a:rPr lang="en-US" sz="1400" dirty="0"/>
+              <a:t> button on HiFive1 board to run demo</a:t>
+            </a:r>
+          </a:p>
+          <a:p>
+            <a:endParaRPr lang="en-US" sz="1400" dirty="0"/>
+          </a:p>
+          <a:p>
+            <a:endParaRPr lang="en-US" sz="1400" dirty="0"/>
+          </a:p>
+        </p:txBody>
+      </p:sp>
+      <p:sp>
+        <p:nvSpPr>
+          <p:cNvPr id="6" name="Rectangle 5">
+            <a:extLst>
+              <a:ext uri="{FF2B5EF4-FFF2-40B4-BE49-F238E27FC236}">
+                <a16:creationId xmlns:a16="http://schemas.microsoft.com/office/drawing/2014/main" id="{57547CCA-A87B-4938-95FE-B17147FF4F08}"/>
+              </a:ext>
+            </a:extLst>
+          </p:cNvPr>
+          <p:cNvSpPr/>
+          <p:nvPr/>
+        </p:nvSpPr>
+        <p:spPr>
+          <a:xfrm>
+            <a:off x="8331200" y="1692658"/>
+            <a:ext cx="250532" cy="313942"/>
+          </a:xfrm>
+          <a:prstGeom prst="rect">
+            <a:avLst/>
+          </a:prstGeom>
+          <a:noFill/>
+          <a:ln w="38100">
+            <a:solidFill>
+              <a:srgbClr val="FF0000"/>
+            </a:solidFill>
+          </a:ln>
+        </p:spPr>
+        <p:style>
+          <a:lnRef idx="2">
+            <a:schemeClr val="accent1">
+              <a:shade val="50000"/>
+            </a:schemeClr>
+          </a:lnRef>
+          <a:fillRef idx="1">
+            <a:schemeClr val="accent1"/>
+          </a:fillRef>
+          <a:effectRef idx="0">
+            <a:schemeClr val="accent1"/>
+          </a:effectRef>
+          <a:fontRef idx="minor">
+            <a:schemeClr val="lt1"/>
+          </a:fontRef>
+        </p:style>
+        <p:txBody>
+          <a:bodyPr rtlCol="0" anchor="ctr"/>
+          <a:lstStyle/>
+          <a:p>
+            <a:pPr algn="ctr"/>
+            <a:endParaRPr lang="en-US"/>
+          </a:p>
+        </p:txBody>
+      </p:sp>
+    </p:spTree>
+    <p:extLst>
+      <p:ext uri="{BB962C8B-B14F-4D97-AF65-F5344CB8AC3E}">
+        <p14:creationId xmlns:p14="http://schemas.microsoft.com/office/powerpoint/2010/main" val="2215448845"/>
+      </p:ext>
+    </p:extLst>
+  </p:cSld>
+  <p:clrMapOvr>
+    <a:masterClrMapping/>
+  </p:clrMapOvr>
+</p:sld>
+</file>
+
+<file path=ppt/slides/slide15.xml><?xml version="1.0" encoding="utf-8"?>
+<p:sld xmlns:a="http://schemas.openxmlformats.org/drawingml/2006/main" xmlns:r="http://schemas.openxmlformats.org/officeDocument/2006/relationships" xmlns:p="http://schemas.openxmlformats.org/presentationml/2006/main">
+  <p:cSld>
+    <p:spTree>
+      <p:nvGrpSpPr>
+        <p:cNvPr id="1" name=""/>
+        <p:cNvGrpSpPr/>
+        <p:nvPr/>
+      </p:nvGrpSpPr>
+      <p:grpSpPr>
+        <a:xfrm>
+          <a:off x="0" y="0"/>
+          <a:ext cx="0" cy="0"/>
+          <a:chOff x="0" y="0"/>
+          <a:chExt cx="0" cy="0"/>
+        </a:xfrm>
+      </p:grpSpPr>
+      <p:sp>
+        <p:nvSpPr>
+          <p:cNvPr id="2" name="Title 1">
+            <a:extLst>
+              <a:ext uri="{FF2B5EF4-FFF2-40B4-BE49-F238E27FC236}">
+                <a16:creationId xmlns:a16="http://schemas.microsoft.com/office/drawing/2014/main" id="{A4536007-94E5-4C78-8F8E-12FD6FC67A92}"/>
+              </a:ext>
+            </a:extLst>
+          </p:cNvPr>
+          <p:cNvSpPr>
+            <a:spLocks noGrp="1"/>
+          </p:cNvSpPr>
+          <p:nvPr>
+            <p:ph type="title"/>
+          </p:nvPr>
+        </p:nvSpPr>
+        <p:spPr/>
+        <p:txBody>
+          <a:bodyPr/>
+          <a:lstStyle/>
+          <a:p>
+            <a:r>
+              <a:rPr lang="en-US" dirty="0"/>
+              <a:t>View print log</a:t>
+            </a:r>
+          </a:p>
+        </p:txBody>
+      </p:sp>
+      <p:sp>
+        <p:nvSpPr>
+          <p:cNvPr id="3" name="Content Placeholder 2">
+            <a:extLst>
+              <a:ext uri="{FF2B5EF4-FFF2-40B4-BE49-F238E27FC236}">
+                <a16:creationId xmlns:a16="http://schemas.microsoft.com/office/drawing/2014/main" id="{B7D593D7-C61E-4F6E-ABD6-663DF502875E}"/>
+              </a:ext>
+            </a:extLst>
+          </p:cNvPr>
+          <p:cNvSpPr>
+            <a:spLocks noGrp="1"/>
+          </p:cNvSpPr>
+          <p:nvPr>
+            <p:ph idx="1"/>
+          </p:nvPr>
+        </p:nvSpPr>
+        <p:spPr>
+          <a:xfrm>
+            <a:off x="838200" y="1443886"/>
+            <a:ext cx="10515600" cy="4351338"/>
+          </a:xfrm>
+        </p:spPr>
+        <p:txBody>
+          <a:bodyPr>
+            <a:normAutofit/>
+          </a:bodyPr>
+          <a:lstStyle/>
+          <a:p>
+            <a:r>
+              <a:rPr lang="en-US" sz="1400" dirty="0"/>
+              <a:t>Use terminal as </a:t>
+            </a:r>
+            <a:r>
+              <a:rPr lang="en-US" sz="1400" dirty="0" err="1"/>
+              <a:t>TeraTerm</a:t>
+            </a:r>
+            <a:r>
+              <a:rPr lang="en-US" sz="1400" dirty="0"/>
+              <a:t> (baud rate = 115200) to see log </a:t>
+            </a:r>
+          </a:p>
+          <a:p>
+            <a:endParaRPr lang="en-US" sz="1400" dirty="0"/>
+          </a:p>
+          <a:p>
+            <a:endParaRPr lang="en-US" sz="1400" dirty="0"/>
+          </a:p>
+          <a:p>
+            <a:endParaRPr lang="en-US" sz="1400" dirty="0"/>
+          </a:p>
+          <a:p>
+            <a:pPr marL="0" indent="0">
+              <a:buNone/>
+            </a:pPr>
+            <a:endParaRPr lang="en-US" sz="1400" dirty="0"/>
+          </a:p>
+          <a:p>
+            <a:pPr marL="0" indent="0">
+              <a:buNone/>
+            </a:pPr>
+            <a:endParaRPr lang="en-US" sz="1400" dirty="0"/>
+          </a:p>
+          <a:p>
+            <a:pPr marL="0" indent="0">
+              <a:buNone/>
+            </a:pPr>
+            <a:endParaRPr lang="en-US" sz="1400" dirty="0"/>
+          </a:p>
+          <a:p>
+            <a:pPr marL="0" indent="0">
+              <a:buNone/>
+            </a:pPr>
+            <a:endParaRPr lang="en-US" sz="1400" dirty="0"/>
+          </a:p>
+          <a:p>
+            <a:pPr marL="0" indent="0">
+              <a:buNone/>
+            </a:pPr>
+            <a:endParaRPr lang="en-US" sz="1400" dirty="0"/>
+          </a:p>
+        </p:txBody>
+      </p:sp>
+      <p:pic>
+        <p:nvPicPr>
+          <p:cNvPr id="4" name="Picture 3">
+            <a:extLst>
+              <a:ext uri="{FF2B5EF4-FFF2-40B4-BE49-F238E27FC236}">
+                <a16:creationId xmlns:a16="http://schemas.microsoft.com/office/drawing/2014/main" id="{B036CB0A-3213-48AC-9B60-E6D861E26C17}"/>
+              </a:ext>
+            </a:extLst>
+          </p:cNvPr>
+          <p:cNvPicPr>
+            <a:picLocks noChangeAspect="1"/>
+          </p:cNvPicPr>
+          <p:nvPr/>
+        </p:nvPicPr>
+        <p:blipFill>
+          <a:blip r:embed="rId2"/>
+          <a:stretch>
+            <a:fillRect/>
+          </a:stretch>
+        </p:blipFill>
+        <p:spPr>
+          <a:xfrm>
+            <a:off x="3639845" y="1970780"/>
+            <a:ext cx="4266895" cy="2152961"/>
+          </a:xfrm>
+          <a:prstGeom prst="rect">
+            <a:avLst/>
+          </a:prstGeom>
+        </p:spPr>
+      </p:pic>
+    </p:spTree>
+    <p:extLst>
+      <p:ext uri="{BB962C8B-B14F-4D97-AF65-F5344CB8AC3E}">
+        <p14:creationId xmlns:p14="http://schemas.microsoft.com/office/powerpoint/2010/main" val="780682194"/>
+      </p:ext>
+    </p:extLst>
+  </p:cSld>
+  <p:clrMapOvr>
+    <a:masterClrMapping/>
+  </p:clrMapOvr>
+</p:sld>
+</file>
+
+<file path=ppt/slides/slide16.xml><?xml version="1.0" encoding="utf-8"?>
+<p:sld xmlns:a="http://schemas.openxmlformats.org/drawingml/2006/main" xmlns:r="http://schemas.openxmlformats.org/officeDocument/2006/relationships" xmlns:p="http://schemas.openxmlformats.org/presentationml/2006/main">
+  <p:cSld>
+    <p:spTree>
+      <p:nvGrpSpPr>
+        <p:cNvPr id="1" name=""/>
+        <p:cNvGrpSpPr/>
+        <p:nvPr/>
+      </p:nvGrpSpPr>
+      <p:grpSpPr>
+        <a:xfrm>
+          <a:off x="0" y="0"/>
+          <a:ext cx="0" cy="0"/>
+          <a:chOff x="0" y="0"/>
+          <a:chExt cx="0" cy="0"/>
+        </a:xfrm>
+      </p:grpSpPr>
+      <p:sp>
+        <p:nvSpPr>
+          <p:cNvPr id="2" name="Title 1">
+            <a:extLst>
+              <a:ext uri="{FF2B5EF4-FFF2-40B4-BE49-F238E27FC236}">
+                <a16:creationId xmlns:a16="http://schemas.microsoft.com/office/drawing/2014/main" id="{F05DD0F9-CF08-4C43-9E82-10A5E17E6448}"/>
+              </a:ext>
+            </a:extLst>
+          </p:cNvPr>
+          <p:cNvSpPr>
+            <a:spLocks noGrp="1"/>
+          </p:cNvSpPr>
+          <p:nvPr>
+            <p:ph type="title"/>
+          </p:nvPr>
+        </p:nvSpPr>
+        <p:spPr/>
+        <p:txBody>
+          <a:bodyPr/>
+          <a:lstStyle/>
+          <a:p>
+            <a:r>
+              <a:rPr lang="en-US" dirty="0"/>
+              <a:t>Build error</a:t>
+            </a:r>
+          </a:p>
+        </p:txBody>
+      </p:sp>
+      <p:sp>
+        <p:nvSpPr>
+          <p:cNvPr id="3" name="Content Placeholder 2">
+            <a:extLst>
+              <a:ext uri="{FF2B5EF4-FFF2-40B4-BE49-F238E27FC236}">
+                <a16:creationId xmlns:a16="http://schemas.microsoft.com/office/drawing/2014/main" id="{6712C5BA-28C6-4DEA-802D-EB4E604BB1F4}"/>
+              </a:ext>
+            </a:extLst>
+          </p:cNvPr>
+          <p:cNvSpPr>
+            <a:spLocks noGrp="1"/>
+          </p:cNvSpPr>
+          <p:nvPr>
+            <p:ph idx="1"/>
+          </p:nvPr>
+        </p:nvSpPr>
+        <p:spPr/>
+        <p:txBody>
+          <a:bodyPr>
+            <a:normAutofit/>
+          </a:bodyPr>
+          <a:lstStyle/>
+          <a:p>
+            <a:r>
+              <a:rPr lang="en-US" sz="1400" dirty="0"/>
+              <a:t>Refer to slide 4 “Edit PATH variable for Freedom Studio” if see this error</a:t>
+            </a:r>
+          </a:p>
+        </p:txBody>
+      </p:sp>
+      <p:pic>
+        <p:nvPicPr>
+          <p:cNvPr id="4" name="Picture 3">
+            <a:extLst>
+              <a:ext uri="{FF2B5EF4-FFF2-40B4-BE49-F238E27FC236}">
+                <a16:creationId xmlns:a16="http://schemas.microsoft.com/office/drawing/2014/main" id="{466A20C9-D761-4CE6-A08A-821E91F0C743}"/>
+              </a:ext>
+            </a:extLst>
+          </p:cNvPr>
+          <p:cNvPicPr>
+            <a:picLocks noChangeAspect="1"/>
+          </p:cNvPicPr>
+          <p:nvPr/>
+        </p:nvPicPr>
+        <p:blipFill>
+          <a:blip r:embed="rId2"/>
+          <a:stretch>
+            <a:fillRect/>
+          </a:stretch>
+        </p:blipFill>
+        <p:spPr>
+          <a:xfrm>
+            <a:off x="2271163" y="2443739"/>
+            <a:ext cx="7878274" cy="3115110"/>
+          </a:xfrm>
+          <a:prstGeom prst="rect">
+            <a:avLst/>
+          </a:prstGeom>
+        </p:spPr>
+      </p:pic>
+    </p:spTree>
+    <p:extLst>
+      <p:ext uri="{BB962C8B-B14F-4D97-AF65-F5344CB8AC3E}">
+        <p14:creationId xmlns:p14="http://schemas.microsoft.com/office/powerpoint/2010/main" val="352524617"/>
       </p:ext>
     </p:extLst>
   </p:cSld>
@@ -3473,7 +4663,7 @@
           <p:cNvPr id="2" name="Title 1">
             <a:extLst>
               <a:ext uri="{FF2B5EF4-FFF2-40B4-BE49-F238E27FC236}">
-                <a16:creationId xmlns:a16="http://schemas.microsoft.com/office/drawing/2014/main" id="{FEA7EBE1-F446-440A-B870-A732003BB5EE}"/>
+                <a16:creationId xmlns:a16="http://schemas.microsoft.com/office/drawing/2014/main" id="{EE05D37A-5622-4672-8AC5-894DB566858B}"/>
               </a:ext>
             </a:extLst>
           </p:cNvPr>
@@ -3491,116 +4681,73 @@
           <a:p>
             <a:r>
               <a:rPr lang="en-US" dirty="0"/>
+              <a:t>Software requirement</a:t>
+            </a:r>
+          </a:p>
+        </p:txBody>
+      </p:sp>
+      <p:sp>
+        <p:nvSpPr>
+          <p:cNvPr id="3" name="Content Placeholder 2">
+            <a:extLst>
+              <a:ext uri="{FF2B5EF4-FFF2-40B4-BE49-F238E27FC236}">
+                <a16:creationId xmlns:a16="http://schemas.microsoft.com/office/drawing/2014/main" id="{7F5CB90A-0A54-4B44-A564-B14D9DDD7CD2}"/>
+              </a:ext>
+            </a:extLst>
+          </p:cNvPr>
+          <p:cNvSpPr>
+            <a:spLocks noGrp="1"/>
+          </p:cNvSpPr>
+          <p:nvPr>
+            <p:ph idx="1"/>
+          </p:nvPr>
+        </p:nvSpPr>
+        <p:spPr/>
+        <p:txBody>
+          <a:bodyPr>
+            <a:normAutofit/>
+          </a:bodyPr>
+          <a:lstStyle/>
+          <a:p>
+            <a:r>
+              <a:rPr lang="en-US" sz="1400" dirty="0"/>
               <a:t>Freedom Studio</a:t>
             </a:r>
           </a:p>
-        </p:txBody>
-      </p:sp>
-      <p:sp>
-        <p:nvSpPr>
-          <p:cNvPr id="3" name="Content Placeholder 2">
-            <a:extLst>
-              <a:ext uri="{FF2B5EF4-FFF2-40B4-BE49-F238E27FC236}">
-                <a16:creationId xmlns:a16="http://schemas.microsoft.com/office/drawing/2014/main" id="{68325EEC-1745-42E1-B459-A79B55BCA590}"/>
-              </a:ext>
-            </a:extLst>
-          </p:cNvPr>
-          <p:cNvSpPr>
-            <a:spLocks noGrp="1"/>
-          </p:cNvSpPr>
-          <p:nvPr>
-            <p:ph idx="1"/>
-          </p:nvPr>
-        </p:nvSpPr>
-        <p:spPr>
-          <a:xfrm>
-            <a:off x="838200" y="1459865"/>
-            <a:ext cx="10515600" cy="4351338"/>
-          </a:xfrm>
-        </p:spPr>
-        <p:txBody>
-          <a:bodyPr/>
-          <a:lstStyle/>
-          <a:p>
-            <a:r>
-              <a:rPr lang="en-US" dirty="0"/>
-              <a:t>Go to </a:t>
-            </a:r>
-            <a:r>
-              <a:rPr lang="en-US" dirty="0">
-                <a:hlinkClick r:id="rId2"/>
-              </a:rPr>
-              <a:t>https://www.sifive.com/boards</a:t>
-            </a:r>
-            <a:r>
-              <a:rPr lang="en-US" dirty="0"/>
-              <a:t> </a:t>
-            </a:r>
-          </a:p>
-          <a:p>
-            <a:r>
-              <a:rPr lang="en-US" dirty="0"/>
-              <a:t>Download </a:t>
-            </a:r>
-            <a:r>
-              <a:rPr lang="en-US" dirty="0">
+          <a:p>
+            <a:pPr lvl="1"/>
+            <a:r>
+              <a:rPr lang="en-US" sz="1400" dirty="0">
                 <a:solidFill>
                   <a:srgbClr val="FF0000"/>
                 </a:solidFill>
               </a:rPr>
-              <a:t>Freedom Studio </a:t>
-            </a:r>
-            <a:r>
-              <a:rPr lang="en-US" dirty="0"/>
-              <a:t>and extract it</a:t>
-            </a:r>
-          </a:p>
-          <a:p>
-            <a:r>
-              <a:rPr lang="en-US" sz="2400" dirty="0"/>
-              <a:t>(This document use FreedomStudio-2019-08-1-win64.zip)</a:t>
-            </a:r>
-            <a:br>
-              <a:rPr lang="en-US" dirty="0"/>
-            </a:br>
-            <a:endParaRPr lang="en-US" dirty="0"/>
-          </a:p>
-        </p:txBody>
-      </p:sp>
-      <p:pic>
-        <p:nvPicPr>
-          <p:cNvPr id="4" name="Picture 3">
-            <a:extLst>
-              <a:ext uri="{FF2B5EF4-FFF2-40B4-BE49-F238E27FC236}">
-                <a16:creationId xmlns:a16="http://schemas.microsoft.com/office/drawing/2014/main" id="{0327DB2F-62FD-45E2-8E34-673E1DBA7FF8}"/>
-              </a:ext>
-            </a:extLst>
-          </p:cNvPr>
-          <p:cNvPicPr>
-            <a:picLocks noChangeAspect="1"/>
-          </p:cNvPicPr>
-          <p:nvPr/>
-        </p:nvPicPr>
-        <p:blipFill>
-          <a:blip r:embed="rId3"/>
-          <a:stretch>
-            <a:fillRect/>
-          </a:stretch>
-        </p:blipFill>
-        <p:spPr>
-          <a:xfrm>
-            <a:off x="2911696" y="2978150"/>
-            <a:ext cx="5927740" cy="3514725"/>
-          </a:xfrm>
-          <a:prstGeom prst="rect">
-            <a:avLst/>
-          </a:prstGeom>
-        </p:spPr>
-      </p:pic>
+              <a:t>FreedomStudio-2019-08-1-win64.zip</a:t>
+            </a:r>
+          </a:p>
+          <a:p>
+            <a:r>
+              <a:rPr lang="en-US" sz="1400" dirty="0"/>
+              <a:t>Demo source code </a:t>
+            </a:r>
+          </a:p>
+          <a:p>
+            <a:pPr lvl="1"/>
+            <a:r>
+              <a:rPr lang="en-US" sz="1400" dirty="0">
+                <a:solidFill>
+                  <a:srgbClr val="FF0000"/>
+                </a:solidFill>
+              </a:rPr>
+              <a:t>freertos-code-r2752-trunk_SHC_demo.7z	</a:t>
+            </a:r>
+          </a:p>
+        </p:txBody>
+      </p:sp>
     </p:spTree>
     <p:extLst>
       <p:ext uri="{BB962C8B-B14F-4D97-AF65-F5344CB8AC3E}">
-        <p14:creationId xmlns:p14="http://schemas.microsoft.com/office/powerpoint/2010/main" val="3719367405"/>
+        <p14:creationId xmlns:p14="http://schemas.microsoft.com/office/powerpoint/2010/main" val="1059319138"/>
       </p:ext>
     </p:extLst>
   </p:cSld>
@@ -3632,7 +4779,7 @@
           <p:cNvPr id="2" name="Title 1">
             <a:extLst>
               <a:ext uri="{FF2B5EF4-FFF2-40B4-BE49-F238E27FC236}">
-                <a16:creationId xmlns:a16="http://schemas.microsoft.com/office/drawing/2014/main" id="{632F5255-27E7-467E-85D2-C3D9B7099C5F}"/>
+                <a16:creationId xmlns:a16="http://schemas.microsoft.com/office/drawing/2014/main" id="{FEA7EBE1-F446-440A-B870-A732003BB5EE}"/>
               </a:ext>
             </a:extLst>
           </p:cNvPr>
@@ -3650,7 +4797,7 @@
           <a:p>
             <a:r>
               <a:rPr lang="en-US" dirty="0"/>
-              <a:t>HiFive1 demo</a:t>
+              <a:t>Freedom Studio</a:t>
             </a:r>
           </a:p>
         </p:txBody>
@@ -3660,7 +4807,7 @@
           <p:cNvPr id="3" name="Content Placeholder 2">
             <a:extLst>
               <a:ext uri="{FF2B5EF4-FFF2-40B4-BE49-F238E27FC236}">
-                <a16:creationId xmlns:a16="http://schemas.microsoft.com/office/drawing/2014/main" id="{0CD4F88B-F426-47E8-92BC-5740730E7027}"/>
+                <a16:creationId xmlns:a16="http://schemas.microsoft.com/office/drawing/2014/main" id="{68325EEC-1745-42E1-B459-A79B55BCA590}"/>
               </a:ext>
             </a:extLst>
           </p:cNvPr>
@@ -3671,18 +4818,61 @@
             <p:ph idx="1"/>
           </p:nvPr>
         </p:nvSpPr>
-        <p:spPr/>
-        <p:txBody>
-          <a:bodyPr/>
-          <a:lstStyle/>
-          <a:p>
-            <a:r>
-              <a:rPr lang="en-US" dirty="0"/>
-              <a:t>Extract Workspace_FreeRTOS_HiFive1.7z</a:t>
-            </a:r>
-          </a:p>
-          <a:p>
-            <a:endParaRPr lang="en-US" dirty="0"/>
+        <p:spPr>
+          <a:xfrm>
+            <a:off x="838200" y="1459865"/>
+            <a:ext cx="10515600" cy="4351338"/>
+          </a:xfrm>
+        </p:spPr>
+        <p:txBody>
+          <a:bodyPr>
+            <a:normAutofit/>
+          </a:bodyPr>
+          <a:lstStyle/>
+          <a:p>
+            <a:r>
+              <a:rPr lang="en-US" sz="1400" dirty="0"/>
+              <a:t>Go to </a:t>
+            </a:r>
+            <a:r>
+              <a:rPr lang="en-US" sz="1400" dirty="0">
+                <a:hlinkClick r:id="rId2"/>
+              </a:rPr>
+              <a:t>https://www.sifive.com/boards</a:t>
+            </a:r>
+            <a:r>
+              <a:rPr lang="en-US" sz="1400" dirty="0"/>
+              <a:t> </a:t>
+            </a:r>
+          </a:p>
+          <a:p>
+            <a:r>
+              <a:rPr lang="en-US" sz="1400" dirty="0"/>
+              <a:t>Download </a:t>
+            </a:r>
+            <a:r>
+              <a:rPr lang="en-US" sz="1400" dirty="0">
+                <a:solidFill>
+                  <a:srgbClr val="FF0000"/>
+                </a:solidFill>
+              </a:rPr>
+              <a:t>Freedom Studio </a:t>
+            </a:r>
+            <a:r>
+              <a:rPr lang="en-US" sz="1400" dirty="0"/>
+              <a:t>and extract it</a:t>
+            </a:r>
+          </a:p>
+          <a:p>
+            <a:pPr lvl="1"/>
+            <a:r>
+              <a:rPr lang="en-US" sz="1400" dirty="0"/>
+              <a:t>(This document use FreedomStudio-2019-08-1-win64.zip)</a:t>
+            </a:r>
+            <a:br>
+              <a:rPr lang="en-US" sz="1400" dirty="0"/>
+            </a:br>
+            <a:endParaRPr lang="en-US" sz="1400" dirty="0"/>
           </a:p>
         </p:txBody>
       </p:sp>
@@ -3691,7 +4881,7 @@
           <p:cNvPr id="4" name="Picture 3">
             <a:extLst>
               <a:ext uri="{FF2B5EF4-FFF2-40B4-BE49-F238E27FC236}">
-                <a16:creationId xmlns:a16="http://schemas.microsoft.com/office/drawing/2014/main" id="{02A37229-2BCA-40F9-BF70-C64DCCABA21F}"/>
+                <a16:creationId xmlns:a16="http://schemas.microsoft.com/office/drawing/2014/main" id="{0327DB2F-62FD-45E2-8E34-673E1DBA7FF8}"/>
               </a:ext>
             </a:extLst>
           </p:cNvPr>
@@ -3701,15 +4891,15 @@
           <p:nvPr/>
         </p:nvPicPr>
         <p:blipFill>
-          <a:blip r:embed="rId2"/>
+          <a:blip r:embed="rId3"/>
           <a:stretch>
             <a:fillRect/>
           </a:stretch>
         </p:blipFill>
         <p:spPr>
           <a:xfrm>
-            <a:off x="2655674" y="3429000"/>
-            <a:ext cx="7529259" cy="2002071"/>
+            <a:off x="2920573" y="2543145"/>
+            <a:ext cx="5927740" cy="3514725"/>
           </a:xfrm>
           <a:prstGeom prst="rect">
             <a:avLst/>
@@ -3719,7 +4909,7 @@
     </p:spTree>
     <p:extLst>
       <p:ext uri="{BB962C8B-B14F-4D97-AF65-F5344CB8AC3E}">
-        <p14:creationId xmlns:p14="http://schemas.microsoft.com/office/powerpoint/2010/main" val="1313363544"/>
+        <p14:creationId xmlns:p14="http://schemas.microsoft.com/office/powerpoint/2010/main" val="3719367405"/>
       </p:ext>
     </p:extLst>
   </p:cSld>
@@ -3751,6 +4941,390 @@
           <p:cNvPr id="2" name="Title 1">
             <a:extLst>
               <a:ext uri="{FF2B5EF4-FFF2-40B4-BE49-F238E27FC236}">
+                <a16:creationId xmlns:a16="http://schemas.microsoft.com/office/drawing/2014/main" id="{FEA7EBE1-F446-440A-B870-A732003BB5EE}"/>
+              </a:ext>
+            </a:extLst>
+          </p:cNvPr>
+          <p:cNvSpPr>
+            <a:spLocks noGrp="1"/>
+          </p:cNvSpPr>
+          <p:nvPr>
+            <p:ph type="title"/>
+          </p:nvPr>
+        </p:nvSpPr>
+        <p:spPr/>
+        <p:txBody>
+          <a:bodyPr/>
+          <a:lstStyle/>
+          <a:p>
+            <a:r>
+              <a:rPr lang="en-US" dirty="0"/>
+              <a:t>Edit PATH variable for Freedom Studio</a:t>
+            </a:r>
+          </a:p>
+        </p:txBody>
+      </p:sp>
+      <p:sp>
+        <p:nvSpPr>
+          <p:cNvPr id="3" name="Content Placeholder 2">
+            <a:extLst>
+              <a:ext uri="{FF2B5EF4-FFF2-40B4-BE49-F238E27FC236}">
+                <a16:creationId xmlns:a16="http://schemas.microsoft.com/office/drawing/2014/main" id="{68325EEC-1745-42E1-B459-A79B55BCA590}"/>
+              </a:ext>
+            </a:extLst>
+          </p:cNvPr>
+          <p:cNvSpPr>
+            <a:spLocks noGrp="1"/>
+          </p:cNvSpPr>
+          <p:nvPr>
+            <p:ph idx="1"/>
+          </p:nvPr>
+        </p:nvSpPr>
+        <p:spPr>
+          <a:xfrm>
+            <a:off x="838200" y="1459865"/>
+            <a:ext cx="6027760" cy="4351338"/>
+          </a:xfrm>
+        </p:spPr>
+        <p:txBody>
+          <a:bodyPr>
+            <a:normAutofit/>
+          </a:bodyPr>
+          <a:lstStyle/>
+          <a:p>
+            <a:r>
+              <a:rPr lang="en-US" sz="1200" dirty="0"/>
+              <a:t>Open </a:t>
+            </a:r>
+            <a:r>
+              <a:rPr lang="en-US" sz="1200" b="1" dirty="0"/>
+              <a:t>System Properties</a:t>
+            </a:r>
+          </a:p>
+          <a:p>
+            <a:r>
+              <a:rPr lang="fr-FR" sz="1200" dirty="0"/>
+              <a:t>Select </a:t>
+            </a:r>
+            <a:r>
+              <a:rPr lang="fr-FR" sz="1200" b="1" dirty="0" err="1"/>
+              <a:t>Environment</a:t>
+            </a:r>
+            <a:r>
+              <a:rPr lang="fr-FR" sz="1200" b="1" dirty="0"/>
+              <a:t> Variables... &gt; User variables &gt; Path </a:t>
+            </a:r>
+          </a:p>
+          <a:p>
+            <a:r>
+              <a:rPr lang="fr-FR" sz="1200" dirty="0"/>
+              <a:t>Click </a:t>
+            </a:r>
+            <a:r>
+              <a:rPr lang="fr-FR" sz="1200" b="1" dirty="0"/>
+              <a:t>Edit…</a:t>
+            </a:r>
+          </a:p>
+          <a:p>
+            <a:r>
+              <a:rPr lang="en-US" sz="1200" dirty="0"/>
+              <a:t>Add new value to PATH</a:t>
+            </a:r>
+          </a:p>
+          <a:p>
+            <a:pPr marL="457200" lvl="1" indent="0">
+              <a:buNone/>
+            </a:pPr>
+            <a:r>
+              <a:rPr lang="en-US" sz="1200" dirty="0"/>
+              <a:t>Example in this manual</a:t>
+            </a:r>
+          </a:p>
+          <a:p>
+            <a:pPr lvl="1"/>
+            <a:r>
+              <a:rPr lang="en-US" sz="1000" dirty="0"/>
+              <a:t>E:\AWS-FreeRTOS-HiFive1\FreedomStudio-2019-08-1-win64\SiFive\riscv64-unknown-elf-gcc-8.3.0-2019.08.0</a:t>
+            </a:r>
+          </a:p>
+          <a:p>
+            <a:pPr lvl="1"/>
+            <a:r>
+              <a:rPr lang="en-US" sz="1000" dirty="0"/>
+              <a:t>E:\AWS-FreeRTOS-HiFive1\FreedomStudio-2019-08-1-win64\SiFive\riscv64-unknown-elf-gcc-8.3.0-2019.08.0\bin</a:t>
+            </a:r>
+          </a:p>
+          <a:p>
+            <a:pPr lvl="1"/>
+            <a:r>
+              <a:rPr lang="en-US" sz="1000" dirty="0"/>
+              <a:t>E:\AWS-FreeRTOS-HiFive1\FreedomStudio-2019-08-1-win64\SiFive\msys64-1.0.0-2019.05.2\usr\bin</a:t>
+            </a:r>
+          </a:p>
+          <a:p>
+            <a:r>
+              <a:rPr lang="en-US" sz="1400" dirty="0"/>
+              <a:t>Click </a:t>
+            </a:r>
+            <a:r>
+              <a:rPr lang="en-US" sz="1400" b="1" dirty="0"/>
+              <a:t>OK</a:t>
+            </a:r>
+          </a:p>
+        </p:txBody>
+      </p:sp>
+      <p:pic>
+        <p:nvPicPr>
+          <p:cNvPr id="5" name="Picture 4">
+            <a:extLst>
+              <a:ext uri="{FF2B5EF4-FFF2-40B4-BE49-F238E27FC236}">
+                <a16:creationId xmlns:a16="http://schemas.microsoft.com/office/drawing/2014/main" id="{07693212-1759-4901-9B18-FE6151FFDEB2}"/>
+              </a:ext>
+            </a:extLst>
+          </p:cNvPr>
+          <p:cNvPicPr>
+            <a:picLocks noChangeAspect="1"/>
+          </p:cNvPicPr>
+          <p:nvPr/>
+        </p:nvPicPr>
+        <p:blipFill>
+          <a:blip r:embed="rId2"/>
+          <a:stretch>
+            <a:fillRect/>
+          </a:stretch>
+        </p:blipFill>
+        <p:spPr>
+          <a:xfrm>
+            <a:off x="6865960" y="1690688"/>
+            <a:ext cx="5095679" cy="3218663"/>
+          </a:xfrm>
+          <a:prstGeom prst="rect">
+            <a:avLst/>
+          </a:prstGeom>
+        </p:spPr>
+      </p:pic>
+      <p:sp>
+        <p:nvSpPr>
+          <p:cNvPr id="6" name="Rectangle 5">
+            <a:extLst>
+              <a:ext uri="{FF2B5EF4-FFF2-40B4-BE49-F238E27FC236}">
+                <a16:creationId xmlns:a16="http://schemas.microsoft.com/office/drawing/2014/main" id="{E955415A-251E-47BC-9DDF-BD1695342C67}"/>
+              </a:ext>
+            </a:extLst>
+          </p:cNvPr>
+          <p:cNvSpPr/>
+          <p:nvPr/>
+        </p:nvSpPr>
+        <p:spPr>
+          <a:xfrm>
+            <a:off x="6960093" y="2716567"/>
+            <a:ext cx="4492101" cy="566014"/>
+          </a:xfrm>
+          <a:prstGeom prst="rect">
+            <a:avLst/>
+          </a:prstGeom>
+          <a:noFill/>
+          <a:ln w="38100">
+            <a:solidFill>
+              <a:srgbClr val="FF0000"/>
+            </a:solidFill>
+          </a:ln>
+        </p:spPr>
+        <p:style>
+          <a:lnRef idx="2">
+            <a:schemeClr val="accent1">
+              <a:shade val="50000"/>
+            </a:schemeClr>
+          </a:lnRef>
+          <a:fillRef idx="1">
+            <a:schemeClr val="accent1"/>
+          </a:fillRef>
+          <a:effectRef idx="0">
+            <a:schemeClr val="accent1"/>
+          </a:effectRef>
+          <a:fontRef idx="minor">
+            <a:schemeClr val="lt1"/>
+          </a:fontRef>
+        </p:style>
+        <p:txBody>
+          <a:bodyPr rtlCol="0" anchor="ctr"/>
+          <a:lstStyle/>
+          <a:p>
+            <a:pPr algn="ctr"/>
+            <a:endParaRPr lang="en-US"/>
+          </a:p>
+        </p:txBody>
+      </p:sp>
+    </p:spTree>
+    <p:extLst>
+      <p:ext uri="{BB962C8B-B14F-4D97-AF65-F5344CB8AC3E}">
+        <p14:creationId xmlns:p14="http://schemas.microsoft.com/office/powerpoint/2010/main" val="1600865227"/>
+      </p:ext>
+    </p:extLst>
+  </p:cSld>
+  <p:clrMapOvr>
+    <a:masterClrMapping/>
+  </p:clrMapOvr>
+</p:sld>
+</file>
+
+<file path=ppt/slides/slide5.xml><?xml version="1.0" encoding="utf-8"?>
+<p:sld xmlns:a="http://schemas.openxmlformats.org/drawingml/2006/main" xmlns:r="http://schemas.openxmlformats.org/officeDocument/2006/relationships" xmlns:p="http://schemas.openxmlformats.org/presentationml/2006/main">
+  <p:cSld>
+    <p:spTree>
+      <p:nvGrpSpPr>
+        <p:cNvPr id="1" name=""/>
+        <p:cNvGrpSpPr/>
+        <p:nvPr/>
+      </p:nvGrpSpPr>
+      <p:grpSpPr>
+        <a:xfrm>
+          <a:off x="0" y="0"/>
+          <a:ext cx="0" cy="0"/>
+          <a:chOff x="0" y="0"/>
+          <a:chExt cx="0" cy="0"/>
+        </a:xfrm>
+      </p:grpSpPr>
+      <p:sp>
+        <p:nvSpPr>
+          <p:cNvPr id="2" name="Title 1">
+            <a:extLst>
+              <a:ext uri="{FF2B5EF4-FFF2-40B4-BE49-F238E27FC236}">
+                <a16:creationId xmlns:a16="http://schemas.microsoft.com/office/drawing/2014/main" id="{632F5255-27E7-467E-85D2-C3D9B7099C5F}"/>
+              </a:ext>
+            </a:extLst>
+          </p:cNvPr>
+          <p:cNvSpPr>
+            <a:spLocks noGrp="1"/>
+          </p:cNvSpPr>
+          <p:nvPr>
+            <p:ph type="title"/>
+          </p:nvPr>
+        </p:nvSpPr>
+        <p:spPr/>
+        <p:txBody>
+          <a:bodyPr/>
+          <a:lstStyle/>
+          <a:p>
+            <a:r>
+              <a:rPr lang="en-US" dirty="0"/>
+              <a:t>HiFive1 demo</a:t>
+            </a:r>
+          </a:p>
+        </p:txBody>
+      </p:sp>
+      <p:sp>
+        <p:nvSpPr>
+          <p:cNvPr id="3" name="Content Placeholder 2">
+            <a:extLst>
+              <a:ext uri="{FF2B5EF4-FFF2-40B4-BE49-F238E27FC236}">
+                <a16:creationId xmlns:a16="http://schemas.microsoft.com/office/drawing/2014/main" id="{0CD4F88B-F426-47E8-92BC-5740730E7027}"/>
+              </a:ext>
+            </a:extLst>
+          </p:cNvPr>
+          <p:cNvSpPr>
+            <a:spLocks noGrp="1"/>
+          </p:cNvSpPr>
+          <p:nvPr>
+            <p:ph idx="1"/>
+          </p:nvPr>
+        </p:nvSpPr>
+        <p:spPr/>
+        <p:txBody>
+          <a:bodyPr>
+            <a:normAutofit/>
+          </a:bodyPr>
+          <a:lstStyle/>
+          <a:p>
+            <a:r>
+              <a:rPr lang="en-US" sz="1400" dirty="0"/>
+              <a:t>Extract </a:t>
+            </a:r>
+            <a:r>
+              <a:rPr lang="en-US" sz="1400" b="1" dirty="0"/>
+              <a:t>Workspace_FreeRTOS_HiFive1.7z</a:t>
+            </a:r>
+          </a:p>
+          <a:p>
+            <a:r>
+              <a:rPr lang="en-US" sz="1400" dirty="0"/>
+              <a:t>Create a new folder named </a:t>
+            </a:r>
+            <a:r>
+              <a:rPr lang="en-US" sz="1400" b="1" dirty="0"/>
+              <a:t>Workspace</a:t>
+            </a:r>
+          </a:p>
+          <a:p>
+            <a:endParaRPr lang="en-US" sz="1400" dirty="0"/>
+          </a:p>
+        </p:txBody>
+      </p:sp>
+      <p:pic>
+        <p:nvPicPr>
+          <p:cNvPr id="6" name="Picture 5">
+            <a:extLst>
+              <a:ext uri="{FF2B5EF4-FFF2-40B4-BE49-F238E27FC236}">
+                <a16:creationId xmlns:a16="http://schemas.microsoft.com/office/drawing/2014/main" id="{9CA4BA82-D0E8-4682-94E6-CE0E9AA04A58}"/>
+              </a:ext>
+            </a:extLst>
+          </p:cNvPr>
+          <p:cNvPicPr>
+            <a:picLocks noChangeAspect="1"/>
+          </p:cNvPicPr>
+          <p:nvPr/>
+        </p:nvPicPr>
+        <p:blipFill>
+          <a:blip r:embed="rId2"/>
+          <a:stretch>
+            <a:fillRect/>
+          </a:stretch>
+        </p:blipFill>
+        <p:spPr>
+          <a:xfrm>
+            <a:off x="3228575" y="3115345"/>
+            <a:ext cx="5734850" cy="1771897"/>
+          </a:xfrm>
+          <a:prstGeom prst="rect">
+            <a:avLst/>
+          </a:prstGeom>
+        </p:spPr>
+      </p:pic>
+    </p:spTree>
+    <p:extLst>
+      <p:ext uri="{BB962C8B-B14F-4D97-AF65-F5344CB8AC3E}">
+        <p14:creationId xmlns:p14="http://schemas.microsoft.com/office/powerpoint/2010/main" val="1313363544"/>
+      </p:ext>
+    </p:extLst>
+  </p:cSld>
+  <p:clrMapOvr>
+    <a:masterClrMapping/>
+  </p:clrMapOvr>
+</p:sld>
+</file>
+
+<file path=ppt/slides/slide6.xml><?xml version="1.0" encoding="utf-8"?>
+<p:sld xmlns:a="http://schemas.openxmlformats.org/drawingml/2006/main" xmlns:r="http://schemas.openxmlformats.org/officeDocument/2006/relationships" xmlns:p="http://schemas.openxmlformats.org/presentationml/2006/main">
+  <p:cSld>
+    <p:spTree>
+      <p:nvGrpSpPr>
+        <p:cNvPr id="1" name=""/>
+        <p:cNvGrpSpPr/>
+        <p:nvPr/>
+      </p:nvGrpSpPr>
+      <p:grpSpPr>
+        <a:xfrm>
+          <a:off x="0" y="0"/>
+          <a:ext cx="0" cy="0"/>
+          <a:chOff x="0" y="0"/>
+          <a:chExt cx="0" cy="0"/>
+        </a:xfrm>
+      </p:grpSpPr>
+      <p:sp>
+        <p:nvSpPr>
+          <p:cNvPr id="2" name="Title 1">
+            <a:extLst>
+              <a:ext uri="{FF2B5EF4-FFF2-40B4-BE49-F238E27FC236}">
                 <a16:creationId xmlns:a16="http://schemas.microsoft.com/office/drawing/2014/main" id="{CBBDD9A8-C754-4906-B036-705FCCA5C07C}"/>
               </a:ext>
             </a:extLst>
@@ -3792,19 +5366,21 @@
         </p:nvSpPr>
         <p:spPr/>
         <p:txBody>
-          <a:bodyPr/>
-          <a:lstStyle/>
-          <a:p>
-            <a:r>
-              <a:rPr lang="en-US" dirty="0"/>
+          <a:bodyPr>
+            <a:normAutofit/>
+          </a:bodyPr>
+          <a:lstStyle/>
+          <a:p>
+            <a:r>
+              <a:rPr lang="en-US" sz="1400" dirty="0"/>
               <a:t>Run </a:t>
             </a:r>
             <a:r>
-              <a:rPr lang="en-US" dirty="0" err="1"/>
+              <a:rPr lang="en-US" sz="1400" dirty="0" err="1"/>
               <a:t>FreedomStudio</a:t>
             </a:r>
             <a:r>
-              <a:rPr lang="en-US" dirty="0"/>
+              <a:rPr lang="en-US" sz="1400" dirty="0"/>
               <a:t> and navigate to Workspace</a:t>
             </a:r>
           </a:p>
@@ -3853,7 +5429,7 @@
 </p:sld>
 </file>
 
-<file path=ppt/slides/slide5.xml><?xml version="1.0" encoding="utf-8"?>
+<file path=ppt/slides/slide7.xml><?xml version="1.0" encoding="utf-8"?>
 <p:sld xmlns:a="http://schemas.openxmlformats.org/drawingml/2006/main" xmlns:r="http://schemas.openxmlformats.org/officeDocument/2006/relationships" xmlns:p="http://schemas.openxmlformats.org/presentationml/2006/main">
   <p:cSld>
     <p:spTree>
@@ -3875,6 +5451,433 @@
           <p:cNvPr id="2" name="Title 1">
             <a:extLst>
               <a:ext uri="{FF2B5EF4-FFF2-40B4-BE49-F238E27FC236}">
+                <a16:creationId xmlns:a16="http://schemas.microsoft.com/office/drawing/2014/main" id="{EF1E32EF-C240-4301-A9B1-90DD98F93A31}"/>
+              </a:ext>
+            </a:extLst>
+          </p:cNvPr>
+          <p:cNvSpPr>
+            <a:spLocks noGrp="1"/>
+          </p:cNvSpPr>
+          <p:nvPr>
+            <p:ph type="title"/>
+          </p:nvPr>
+        </p:nvSpPr>
+        <p:spPr/>
+        <p:txBody>
+          <a:bodyPr/>
+          <a:lstStyle/>
+          <a:p>
+            <a:r>
+              <a:rPr lang="en-US" dirty="0"/>
+              <a:t>Import Project</a:t>
+            </a:r>
+          </a:p>
+        </p:txBody>
+      </p:sp>
+      <p:sp>
+        <p:nvSpPr>
+          <p:cNvPr id="4" name="TextBox 3">
+            <a:extLst>
+              <a:ext uri="{FF2B5EF4-FFF2-40B4-BE49-F238E27FC236}">
+                <a16:creationId xmlns:a16="http://schemas.microsoft.com/office/drawing/2014/main" id="{5530771A-7A73-4A31-809E-D1D677E7EBD4}"/>
+              </a:ext>
+            </a:extLst>
+          </p:cNvPr>
+          <p:cNvSpPr txBox="1"/>
+          <p:nvPr/>
+        </p:nvSpPr>
+        <p:spPr>
+          <a:xfrm>
+            <a:off x="838200" y="1690688"/>
+            <a:ext cx="5257800" cy="738664"/>
+          </a:xfrm>
+          <a:prstGeom prst="rect">
+            <a:avLst/>
+          </a:prstGeom>
+          <a:noFill/>
+        </p:spPr>
+        <p:txBody>
+          <a:bodyPr wrap="square" rtlCol="0">
+            <a:spAutoFit/>
+          </a:bodyPr>
+          <a:lstStyle/>
+          <a:p>
+            <a:pPr marL="285750" indent="-285750">
+              <a:buFont typeface="Arial" panose="020B0604020202020204" pitchFamily="34" charset="0"/>
+              <a:buChar char="•"/>
+            </a:pPr>
+            <a:r>
+              <a:rPr lang="en-US" sz="1400" dirty="0"/>
+              <a:t>In Menu select </a:t>
+            </a:r>
+            <a:r>
+              <a:rPr lang="en-US" sz="1400" b="1" dirty="0"/>
+              <a:t>File &gt; Import </a:t>
+            </a:r>
+          </a:p>
+          <a:p>
+            <a:pPr marL="285750" indent="-285750">
+              <a:buFont typeface="Arial" panose="020B0604020202020204" pitchFamily="34" charset="0"/>
+              <a:buChar char="•"/>
+            </a:pPr>
+            <a:r>
+              <a:rPr lang="en-US" sz="1400" dirty="0"/>
+              <a:t>Select </a:t>
+            </a:r>
+            <a:r>
+              <a:rPr lang="en-US" sz="1400" b="1" dirty="0"/>
+              <a:t>General &gt; Existing Projects into Workspace</a:t>
+            </a:r>
+          </a:p>
+          <a:p>
+            <a:pPr marL="285750" indent="-285750">
+              <a:buFont typeface="Arial" panose="020B0604020202020204" pitchFamily="34" charset="0"/>
+              <a:buChar char="•"/>
+            </a:pPr>
+            <a:r>
+              <a:rPr lang="en-US" sz="1400" dirty="0"/>
+              <a:t>Click </a:t>
+            </a:r>
+            <a:r>
+              <a:rPr lang="en-US" sz="1400" b="1" dirty="0"/>
+              <a:t>Next</a:t>
+            </a:r>
+          </a:p>
+        </p:txBody>
+      </p:sp>
+      <p:pic>
+        <p:nvPicPr>
+          <p:cNvPr id="5" name="Picture 4">
+            <a:extLst>
+              <a:ext uri="{FF2B5EF4-FFF2-40B4-BE49-F238E27FC236}">
+                <a16:creationId xmlns:a16="http://schemas.microsoft.com/office/drawing/2014/main" id="{76CF472A-E05C-4350-806A-7ED92B610510}"/>
+              </a:ext>
+            </a:extLst>
+          </p:cNvPr>
+          <p:cNvPicPr>
+            <a:picLocks noChangeAspect="1"/>
+          </p:cNvPicPr>
+          <p:nvPr/>
+        </p:nvPicPr>
+        <p:blipFill>
+          <a:blip r:embed="rId2"/>
+          <a:stretch>
+            <a:fillRect/>
+          </a:stretch>
+        </p:blipFill>
+        <p:spPr>
+          <a:xfrm>
+            <a:off x="6924891" y="861654"/>
+            <a:ext cx="4858428" cy="5134692"/>
+          </a:xfrm>
+          <a:prstGeom prst="rect">
+            <a:avLst/>
+          </a:prstGeom>
+        </p:spPr>
+      </p:pic>
+      <p:sp>
+        <p:nvSpPr>
+          <p:cNvPr id="6" name="Rectangle 5">
+            <a:extLst>
+              <a:ext uri="{FF2B5EF4-FFF2-40B4-BE49-F238E27FC236}">
+                <a16:creationId xmlns:a16="http://schemas.microsoft.com/office/drawing/2014/main" id="{7EDA2C39-2752-4DCE-850E-2DEEAC639999}"/>
+              </a:ext>
+            </a:extLst>
+          </p:cNvPr>
+          <p:cNvSpPr/>
+          <p:nvPr/>
+        </p:nvSpPr>
+        <p:spPr>
+          <a:xfrm>
+            <a:off x="7368413" y="2698812"/>
+            <a:ext cx="1962018" cy="230820"/>
+          </a:xfrm>
+          <a:prstGeom prst="rect">
+            <a:avLst/>
+          </a:prstGeom>
+          <a:noFill/>
+          <a:ln w="38100">
+            <a:solidFill>
+              <a:srgbClr val="FF0000"/>
+            </a:solidFill>
+          </a:ln>
+        </p:spPr>
+        <p:style>
+          <a:lnRef idx="2">
+            <a:schemeClr val="accent1">
+              <a:shade val="50000"/>
+            </a:schemeClr>
+          </a:lnRef>
+          <a:fillRef idx="1">
+            <a:schemeClr val="accent1"/>
+          </a:fillRef>
+          <a:effectRef idx="0">
+            <a:schemeClr val="accent1"/>
+          </a:effectRef>
+          <a:fontRef idx="minor">
+            <a:schemeClr val="lt1"/>
+          </a:fontRef>
+        </p:style>
+        <p:txBody>
+          <a:bodyPr rtlCol="0" anchor="ctr"/>
+          <a:lstStyle/>
+          <a:p>
+            <a:pPr algn="ctr"/>
+            <a:endParaRPr lang="en-US"/>
+          </a:p>
+        </p:txBody>
+      </p:sp>
+    </p:spTree>
+    <p:extLst>
+      <p:ext uri="{BB962C8B-B14F-4D97-AF65-F5344CB8AC3E}">
+        <p14:creationId xmlns:p14="http://schemas.microsoft.com/office/powerpoint/2010/main" val="3374402157"/>
+      </p:ext>
+    </p:extLst>
+  </p:cSld>
+  <p:clrMapOvr>
+    <a:masterClrMapping/>
+  </p:clrMapOvr>
+</p:sld>
+</file>
+
+<file path=ppt/slides/slide8.xml><?xml version="1.0" encoding="utf-8"?>
+<p:sld xmlns:a="http://schemas.openxmlformats.org/drawingml/2006/main" xmlns:r="http://schemas.openxmlformats.org/officeDocument/2006/relationships" xmlns:p="http://schemas.openxmlformats.org/presentationml/2006/main">
+  <p:cSld>
+    <p:spTree>
+      <p:nvGrpSpPr>
+        <p:cNvPr id="1" name=""/>
+        <p:cNvGrpSpPr/>
+        <p:nvPr/>
+      </p:nvGrpSpPr>
+      <p:grpSpPr>
+        <a:xfrm>
+          <a:off x="0" y="0"/>
+          <a:ext cx="0" cy="0"/>
+          <a:chOff x="0" y="0"/>
+          <a:chExt cx="0" cy="0"/>
+        </a:xfrm>
+      </p:grpSpPr>
+      <p:sp>
+        <p:nvSpPr>
+          <p:cNvPr id="2" name="Title 1">
+            <a:extLst>
+              <a:ext uri="{FF2B5EF4-FFF2-40B4-BE49-F238E27FC236}">
+                <a16:creationId xmlns:a16="http://schemas.microsoft.com/office/drawing/2014/main" id="{3A1D8DD7-BA4B-4CDB-87C3-C1B2C7DBA7D6}"/>
+              </a:ext>
+            </a:extLst>
+          </p:cNvPr>
+          <p:cNvSpPr>
+            <a:spLocks noGrp="1"/>
+          </p:cNvSpPr>
+          <p:nvPr>
+            <p:ph type="title"/>
+          </p:nvPr>
+        </p:nvSpPr>
+        <p:spPr/>
+        <p:txBody>
+          <a:bodyPr/>
+          <a:lstStyle/>
+          <a:p>
+            <a:r>
+              <a:rPr lang="en-US" dirty="0"/>
+              <a:t>Import Project</a:t>
+            </a:r>
+          </a:p>
+        </p:txBody>
+      </p:sp>
+      <p:sp>
+        <p:nvSpPr>
+          <p:cNvPr id="3" name="Content Placeholder 2">
+            <a:extLst>
+              <a:ext uri="{FF2B5EF4-FFF2-40B4-BE49-F238E27FC236}">
+                <a16:creationId xmlns:a16="http://schemas.microsoft.com/office/drawing/2014/main" id="{B9DD0697-3878-4D57-9F18-918D8968A069}"/>
+              </a:ext>
+            </a:extLst>
+          </p:cNvPr>
+          <p:cNvSpPr>
+            <a:spLocks noGrp="1"/>
+          </p:cNvSpPr>
+          <p:nvPr>
+            <p:ph idx="1"/>
+          </p:nvPr>
+        </p:nvSpPr>
+        <p:spPr/>
+        <p:txBody>
+          <a:bodyPr>
+            <a:normAutofit/>
+          </a:bodyPr>
+          <a:lstStyle/>
+          <a:p>
+            <a:r>
+              <a:rPr lang="en-US" sz="1400" dirty="0"/>
+              <a:t>Choose </a:t>
+            </a:r>
+            <a:r>
+              <a:rPr lang="en-US" sz="1400" b="1" dirty="0"/>
+              <a:t>Select root directory</a:t>
+            </a:r>
+          </a:p>
+          <a:p>
+            <a:r>
+              <a:rPr lang="en-US" sz="1400" dirty="0"/>
+              <a:t>Click </a:t>
+            </a:r>
+            <a:r>
+              <a:rPr lang="en-US" sz="1400" b="1" dirty="0"/>
+              <a:t>Browse</a:t>
+            </a:r>
+            <a:r>
+              <a:rPr lang="en-US" sz="1400" dirty="0"/>
+              <a:t>… and navigate to </a:t>
+            </a:r>
+            <a:r>
+              <a:rPr lang="en-US" sz="1400" b="1" dirty="0"/>
+              <a:t>freertos-code-r2752-trunk_SHC_demo</a:t>
+            </a:r>
+            <a:r>
+              <a:rPr lang="en-US" sz="1400" dirty="0"/>
+              <a:t> directory</a:t>
+            </a:r>
+          </a:p>
+          <a:p>
+            <a:r>
+              <a:rPr lang="en-US" sz="1400" dirty="0"/>
+              <a:t>Note: Do not check in </a:t>
+            </a:r>
+            <a:r>
+              <a:rPr lang="en-US" sz="1400" b="1" dirty="0"/>
+              <a:t>Copy projects into workspace</a:t>
+            </a:r>
+          </a:p>
+          <a:p>
+            <a:r>
+              <a:rPr lang="en-US" sz="1400" dirty="0"/>
+              <a:t>Click</a:t>
+            </a:r>
+            <a:r>
+              <a:rPr lang="en-US" sz="1400" b="1" dirty="0"/>
+              <a:t> Finish</a:t>
+            </a:r>
+          </a:p>
+        </p:txBody>
+      </p:sp>
+      <p:pic>
+        <p:nvPicPr>
+          <p:cNvPr id="4" name="Picture 3">
+            <a:extLst>
+              <a:ext uri="{FF2B5EF4-FFF2-40B4-BE49-F238E27FC236}">
+                <a16:creationId xmlns:a16="http://schemas.microsoft.com/office/drawing/2014/main" id="{0B2D13EC-A599-4B51-850D-62C7812BA996}"/>
+              </a:ext>
+            </a:extLst>
+          </p:cNvPr>
+          <p:cNvPicPr>
+            <a:picLocks noChangeAspect="1"/>
+          </p:cNvPicPr>
+          <p:nvPr/>
+        </p:nvPicPr>
+        <p:blipFill>
+          <a:blip r:embed="rId2"/>
+          <a:stretch>
+            <a:fillRect/>
+          </a:stretch>
+        </p:blipFill>
+        <p:spPr>
+          <a:xfrm>
+            <a:off x="7765453" y="807867"/>
+            <a:ext cx="4220720" cy="5867219"/>
+          </a:xfrm>
+          <a:prstGeom prst="rect">
+            <a:avLst/>
+          </a:prstGeom>
+        </p:spPr>
+      </p:pic>
+      <p:sp>
+        <p:nvSpPr>
+          <p:cNvPr id="6" name="Rectangle 5">
+            <a:extLst>
+              <a:ext uri="{FF2B5EF4-FFF2-40B4-BE49-F238E27FC236}">
+                <a16:creationId xmlns:a16="http://schemas.microsoft.com/office/drawing/2014/main" id="{5BB60FE5-31E8-4F6D-A634-1ACF70D460F7}"/>
+              </a:ext>
+            </a:extLst>
+          </p:cNvPr>
+          <p:cNvSpPr/>
+          <p:nvPr/>
+        </p:nvSpPr>
+        <p:spPr>
+          <a:xfrm>
+            <a:off x="7616986" y="1708928"/>
+            <a:ext cx="4369187" cy="350691"/>
+          </a:xfrm>
+          <a:prstGeom prst="rect">
+            <a:avLst/>
+          </a:prstGeom>
+          <a:noFill/>
+          <a:ln w="38100">
+            <a:solidFill>
+              <a:srgbClr val="FF0000"/>
+            </a:solidFill>
+          </a:ln>
+        </p:spPr>
+        <p:style>
+          <a:lnRef idx="2">
+            <a:schemeClr val="accent1">
+              <a:shade val="50000"/>
+            </a:schemeClr>
+          </a:lnRef>
+          <a:fillRef idx="1">
+            <a:schemeClr val="accent1"/>
+          </a:fillRef>
+          <a:effectRef idx="0">
+            <a:schemeClr val="accent1"/>
+          </a:effectRef>
+          <a:fontRef idx="minor">
+            <a:schemeClr val="lt1"/>
+          </a:fontRef>
+        </p:style>
+        <p:txBody>
+          <a:bodyPr rtlCol="0" anchor="ctr"/>
+          <a:lstStyle/>
+          <a:p>
+            <a:pPr algn="ctr"/>
+            <a:endParaRPr lang="en-US"/>
+          </a:p>
+        </p:txBody>
+      </p:sp>
+    </p:spTree>
+    <p:extLst>
+      <p:ext uri="{BB962C8B-B14F-4D97-AF65-F5344CB8AC3E}">
+        <p14:creationId xmlns:p14="http://schemas.microsoft.com/office/powerpoint/2010/main" val="1620355818"/>
+      </p:ext>
+    </p:extLst>
+  </p:cSld>
+  <p:clrMapOvr>
+    <a:masterClrMapping/>
+  </p:clrMapOvr>
+</p:sld>
+</file>
+
+<file path=ppt/slides/slide9.xml><?xml version="1.0" encoding="utf-8"?>
+<p:sld xmlns:a="http://schemas.openxmlformats.org/drawingml/2006/main" xmlns:r="http://schemas.openxmlformats.org/officeDocument/2006/relationships" xmlns:p="http://schemas.openxmlformats.org/presentationml/2006/main">
+  <p:cSld>
+    <p:spTree>
+      <p:nvGrpSpPr>
+        <p:cNvPr id="1" name=""/>
+        <p:cNvGrpSpPr/>
+        <p:nvPr/>
+      </p:nvGrpSpPr>
+      <p:grpSpPr>
+        <a:xfrm>
+          <a:off x="0" y="0"/>
+          <a:ext cx="0" cy="0"/>
+          <a:chOff x="0" y="0"/>
+          <a:chExt cx="0" cy="0"/>
+        </a:xfrm>
+      </p:grpSpPr>
+      <p:sp>
+        <p:nvSpPr>
+          <p:cNvPr id="2" name="Title 1">
+            <a:extLst>
+              <a:ext uri="{FF2B5EF4-FFF2-40B4-BE49-F238E27FC236}">
                 <a16:creationId xmlns:a16="http://schemas.microsoft.com/office/drawing/2014/main" id="{3F26C183-1905-4EDC-BC34-08EB3FA32C54}"/>
               </a:ext>
             </a:extLst>
@@ -3916,24 +5919,26 @@
         </p:nvSpPr>
         <p:spPr/>
         <p:txBody>
-          <a:bodyPr/>
-          <a:lstStyle/>
-          <a:p>
-            <a:r>
-              <a:rPr lang="en-US" dirty="0"/>
+          <a:bodyPr>
+            <a:normAutofit/>
+          </a:bodyPr>
+          <a:lstStyle/>
+          <a:p>
+            <a:r>
+              <a:rPr lang="en-US" sz="1400" dirty="0"/>
               <a:t>Select </a:t>
             </a:r>
             <a:r>
-              <a:rPr lang="en-US" dirty="0" err="1"/>
+              <a:rPr lang="en-US" sz="1400" dirty="0" err="1"/>
               <a:t>RTOSDemo</a:t>
             </a:r>
             <a:r>
-              <a:rPr lang="en-US" dirty="0"/>
+              <a:rPr lang="en-US" sz="1400" dirty="0"/>
               <a:t> and build project</a:t>
             </a:r>
           </a:p>
           <a:p>
-            <a:endParaRPr lang="en-US" dirty="0"/>
+            <a:endParaRPr lang="en-US" sz="1400" dirty="0"/>
           </a:p>
         </p:txBody>
       </p:sp>
@@ -4023,580 +6028,6 @@
     <p:extLst>
       <p:ext uri="{BB962C8B-B14F-4D97-AF65-F5344CB8AC3E}">
         <p14:creationId xmlns:p14="http://schemas.microsoft.com/office/powerpoint/2010/main" val="3464514900"/>
-      </p:ext>
-    </p:extLst>
-  </p:cSld>
-  <p:clrMapOvr>
-    <a:masterClrMapping/>
-  </p:clrMapOvr>
-</p:sld>
-</file>
-
-<file path=ppt/slides/slide6.xml><?xml version="1.0" encoding="utf-8"?>
-<p:sld xmlns:a="http://schemas.openxmlformats.org/drawingml/2006/main" xmlns:r="http://schemas.openxmlformats.org/officeDocument/2006/relationships" xmlns:p="http://schemas.openxmlformats.org/presentationml/2006/main">
-  <p:cSld>
-    <p:spTree>
-      <p:nvGrpSpPr>
-        <p:cNvPr id="1" name=""/>
-        <p:cNvGrpSpPr/>
-        <p:nvPr/>
-      </p:nvGrpSpPr>
-      <p:grpSpPr>
-        <a:xfrm>
-          <a:off x="0" y="0"/>
-          <a:ext cx="0" cy="0"/>
-          <a:chOff x="0" y="0"/>
-          <a:chExt cx="0" cy="0"/>
-        </a:xfrm>
-      </p:grpSpPr>
-      <p:sp>
-        <p:nvSpPr>
-          <p:cNvPr id="2" name="Title 1">
-            <a:extLst>
-              <a:ext uri="{FF2B5EF4-FFF2-40B4-BE49-F238E27FC236}">
-                <a16:creationId xmlns:a16="http://schemas.microsoft.com/office/drawing/2014/main" id="{5839C894-CD14-4B91-9815-C35F6F846CE9}"/>
-              </a:ext>
-            </a:extLst>
-          </p:cNvPr>
-          <p:cNvSpPr>
-            <a:spLocks noGrp="1"/>
-          </p:cNvSpPr>
-          <p:nvPr>
-            <p:ph type="title"/>
-          </p:nvPr>
-        </p:nvSpPr>
-        <p:spPr/>
-        <p:txBody>
-          <a:bodyPr/>
-          <a:lstStyle/>
-          <a:p>
-            <a:r>
-              <a:rPr lang="en-US" dirty="0"/>
-              <a:t>Download binaries to HiFive1</a:t>
-            </a:r>
-          </a:p>
-        </p:txBody>
-      </p:sp>
-      <p:sp>
-        <p:nvSpPr>
-          <p:cNvPr id="3" name="Content Placeholder 2">
-            <a:extLst>
-              <a:ext uri="{FF2B5EF4-FFF2-40B4-BE49-F238E27FC236}">
-                <a16:creationId xmlns:a16="http://schemas.microsoft.com/office/drawing/2014/main" id="{4941DB49-E741-4F16-B6A6-31B8B0472600}"/>
-              </a:ext>
-            </a:extLst>
-          </p:cNvPr>
-          <p:cNvSpPr>
-            <a:spLocks noGrp="1"/>
-          </p:cNvSpPr>
-          <p:nvPr>
-            <p:ph idx="1"/>
-          </p:nvPr>
-        </p:nvSpPr>
-        <p:spPr/>
-        <p:txBody>
-          <a:bodyPr/>
-          <a:lstStyle/>
-          <a:p>
-            <a:r>
-              <a:rPr lang="en-US" dirty="0"/>
-              <a:t>After building finished, connect HiFive1 board to your PC</a:t>
-            </a:r>
-          </a:p>
-          <a:p>
-            <a:r>
-              <a:rPr lang="en-US" dirty="0"/>
-              <a:t>Open Debug Configurations, select </a:t>
-            </a:r>
-            <a:r>
-              <a:rPr lang="en-US" dirty="0" err="1">
-                <a:solidFill>
-                  <a:srgbClr val="FF0000"/>
-                </a:solidFill>
-              </a:rPr>
-              <a:t>RTOSDemo</a:t>
-            </a:r>
-            <a:r>
-              <a:rPr lang="en-US" dirty="0">
-                <a:solidFill>
-                  <a:srgbClr val="FF0000"/>
-                </a:solidFill>
-              </a:rPr>
-              <a:t> Debug </a:t>
-            </a:r>
-            <a:r>
-              <a:rPr lang="en-US" dirty="0"/>
-              <a:t>then click Debug</a:t>
-            </a:r>
-          </a:p>
-          <a:p>
-            <a:endParaRPr lang="en-US" dirty="0"/>
-          </a:p>
-        </p:txBody>
-      </p:sp>
-      <p:pic>
-        <p:nvPicPr>
-          <p:cNvPr id="4" name="Picture 3">
-            <a:extLst>
-              <a:ext uri="{FF2B5EF4-FFF2-40B4-BE49-F238E27FC236}">
-                <a16:creationId xmlns:a16="http://schemas.microsoft.com/office/drawing/2014/main" id="{96647414-C078-446B-99C5-CF96A0FB477C}"/>
-              </a:ext>
-            </a:extLst>
-          </p:cNvPr>
-          <p:cNvPicPr>
-            <a:picLocks noChangeAspect="1"/>
-          </p:cNvPicPr>
-          <p:nvPr/>
-        </p:nvPicPr>
-        <p:blipFill>
-          <a:blip r:embed="rId2"/>
-          <a:stretch>
-            <a:fillRect/>
-          </a:stretch>
-        </p:blipFill>
-        <p:spPr>
-          <a:xfrm>
-            <a:off x="2901118" y="2959100"/>
-            <a:ext cx="5805136" cy="3217863"/>
-          </a:xfrm>
-          <a:prstGeom prst="rect">
-            <a:avLst/>
-          </a:prstGeom>
-        </p:spPr>
-      </p:pic>
-      <p:sp>
-        <p:nvSpPr>
-          <p:cNvPr id="5" name="Rectangle 4">
-            <a:extLst>
-              <a:ext uri="{FF2B5EF4-FFF2-40B4-BE49-F238E27FC236}">
-                <a16:creationId xmlns:a16="http://schemas.microsoft.com/office/drawing/2014/main" id="{C7951346-1CAD-4C7A-B76A-1D3A8A2BCF54}"/>
-              </a:ext>
-            </a:extLst>
-          </p:cNvPr>
-          <p:cNvSpPr/>
-          <p:nvPr/>
-        </p:nvSpPr>
-        <p:spPr>
-          <a:xfrm>
-            <a:off x="3000652" y="4545367"/>
-            <a:ext cx="861134" cy="230819"/>
-          </a:xfrm>
-          <a:prstGeom prst="rect">
-            <a:avLst/>
-          </a:prstGeom>
-          <a:noFill/>
-          <a:ln w="38100">
-            <a:solidFill>
-              <a:srgbClr val="FF0000"/>
-            </a:solidFill>
-          </a:ln>
-        </p:spPr>
-        <p:style>
-          <a:lnRef idx="2">
-            <a:schemeClr val="accent1">
-              <a:shade val="50000"/>
-            </a:schemeClr>
-          </a:lnRef>
-          <a:fillRef idx="1">
-            <a:schemeClr val="accent1"/>
-          </a:fillRef>
-          <a:effectRef idx="0">
-            <a:schemeClr val="accent1"/>
-          </a:effectRef>
-          <a:fontRef idx="minor">
-            <a:schemeClr val="lt1"/>
-          </a:fontRef>
-        </p:style>
-        <p:txBody>
-          <a:bodyPr rtlCol="0" anchor="ctr"/>
-          <a:lstStyle/>
-          <a:p>
-            <a:pPr algn="ctr"/>
-            <a:endParaRPr lang="en-US"/>
-          </a:p>
-        </p:txBody>
-      </p:sp>
-    </p:spTree>
-    <p:extLst>
-      <p:ext uri="{BB962C8B-B14F-4D97-AF65-F5344CB8AC3E}">
-        <p14:creationId xmlns:p14="http://schemas.microsoft.com/office/powerpoint/2010/main" val="995131544"/>
-      </p:ext>
-    </p:extLst>
-  </p:cSld>
-  <p:clrMapOvr>
-    <a:masterClrMapping/>
-  </p:clrMapOvr>
-</p:sld>
-</file>
-
-<file path=ppt/slides/slide7.xml><?xml version="1.0" encoding="utf-8"?>
-<p:sld xmlns:a="http://schemas.openxmlformats.org/drawingml/2006/main" xmlns:r="http://schemas.openxmlformats.org/officeDocument/2006/relationships" xmlns:p="http://schemas.openxmlformats.org/presentationml/2006/main">
-  <p:cSld>
-    <p:spTree>
-      <p:nvGrpSpPr>
-        <p:cNvPr id="1" name=""/>
-        <p:cNvGrpSpPr/>
-        <p:nvPr/>
-      </p:nvGrpSpPr>
-      <p:grpSpPr>
-        <a:xfrm>
-          <a:off x="0" y="0"/>
-          <a:ext cx="0" cy="0"/>
-          <a:chOff x="0" y="0"/>
-          <a:chExt cx="0" cy="0"/>
-        </a:xfrm>
-      </p:grpSpPr>
-      <p:sp>
-        <p:nvSpPr>
-          <p:cNvPr id="2" name="Title 1">
-            <a:extLst>
-              <a:ext uri="{FF2B5EF4-FFF2-40B4-BE49-F238E27FC236}">
-                <a16:creationId xmlns:a16="http://schemas.microsoft.com/office/drawing/2014/main" id="{21AFE027-AA71-4191-ACD8-860D04401BD7}"/>
-              </a:ext>
-            </a:extLst>
-          </p:cNvPr>
-          <p:cNvSpPr>
-            <a:spLocks noGrp="1"/>
-          </p:cNvSpPr>
-          <p:nvPr>
-            <p:ph type="title"/>
-          </p:nvPr>
-        </p:nvSpPr>
-        <p:spPr/>
-        <p:txBody>
-          <a:bodyPr/>
-          <a:lstStyle/>
-          <a:p>
-            <a:r>
-              <a:rPr lang="en-US" dirty="0"/>
-              <a:t>Run HiFive1 demo</a:t>
-            </a:r>
-          </a:p>
-        </p:txBody>
-      </p:sp>
-      <p:sp>
-        <p:nvSpPr>
-          <p:cNvPr id="3" name="Content Placeholder 2">
-            <a:extLst>
-              <a:ext uri="{FF2B5EF4-FFF2-40B4-BE49-F238E27FC236}">
-                <a16:creationId xmlns:a16="http://schemas.microsoft.com/office/drawing/2014/main" id="{D23E1169-6FD9-48A9-AB29-1D8A5C1B45A6}"/>
-              </a:ext>
-            </a:extLst>
-          </p:cNvPr>
-          <p:cNvSpPr>
-            <a:spLocks noGrp="1"/>
-          </p:cNvSpPr>
-          <p:nvPr>
-            <p:ph idx="1"/>
-          </p:nvPr>
-        </p:nvSpPr>
-        <p:spPr>
-          <a:xfrm>
-            <a:off x="838200" y="1610789"/>
-            <a:ext cx="10515600" cy="4351338"/>
-          </a:xfrm>
-        </p:spPr>
-        <p:txBody>
-          <a:bodyPr/>
-          <a:lstStyle/>
-          <a:p>
-            <a:r>
-              <a:rPr lang="en-US" dirty="0"/>
-              <a:t>Select Terminate to stop Debug</a:t>
-            </a:r>
-          </a:p>
-          <a:p>
-            <a:r>
-              <a:rPr lang="en-US" dirty="0"/>
-              <a:t>Press RESET button on HiFive1 board to run demo</a:t>
-            </a:r>
-          </a:p>
-          <a:p>
-            <a:endParaRPr lang="en-US" dirty="0"/>
-          </a:p>
-          <a:p>
-            <a:endParaRPr lang="en-US" dirty="0"/>
-          </a:p>
-        </p:txBody>
-      </p:sp>
-      <p:pic>
-        <p:nvPicPr>
-          <p:cNvPr id="5" name="Picture 4">
-            <a:extLst>
-              <a:ext uri="{FF2B5EF4-FFF2-40B4-BE49-F238E27FC236}">
-                <a16:creationId xmlns:a16="http://schemas.microsoft.com/office/drawing/2014/main" id="{3C83C527-8CCD-4991-81B0-E68C26A39B5A}"/>
-              </a:ext>
-            </a:extLst>
-          </p:cNvPr>
-          <p:cNvPicPr>
-            <a:picLocks noChangeAspect="1"/>
-          </p:cNvPicPr>
-          <p:nvPr/>
-        </p:nvPicPr>
-        <p:blipFill>
-          <a:blip r:embed="rId2"/>
-          <a:stretch>
-            <a:fillRect/>
-          </a:stretch>
-        </p:blipFill>
-        <p:spPr>
-          <a:xfrm>
-            <a:off x="1899382" y="2553198"/>
-            <a:ext cx="8194529" cy="3939677"/>
-          </a:xfrm>
-          <a:prstGeom prst="rect">
-            <a:avLst/>
-          </a:prstGeom>
-        </p:spPr>
-      </p:pic>
-      <p:sp>
-        <p:nvSpPr>
-          <p:cNvPr id="6" name="Rectangle 5">
-            <a:extLst>
-              <a:ext uri="{FF2B5EF4-FFF2-40B4-BE49-F238E27FC236}">
-                <a16:creationId xmlns:a16="http://schemas.microsoft.com/office/drawing/2014/main" id="{57547CCA-A87B-4938-95FE-B17147FF4F08}"/>
-              </a:ext>
-            </a:extLst>
-          </p:cNvPr>
-          <p:cNvSpPr/>
-          <p:nvPr/>
-        </p:nvSpPr>
-        <p:spPr>
-          <a:xfrm>
-            <a:off x="4740675" y="2707688"/>
-            <a:ext cx="284086" cy="363985"/>
-          </a:xfrm>
-          <a:prstGeom prst="rect">
-            <a:avLst/>
-          </a:prstGeom>
-          <a:noFill/>
-          <a:ln w="38100">
-            <a:solidFill>
-              <a:srgbClr val="FF0000"/>
-            </a:solidFill>
-          </a:ln>
-        </p:spPr>
-        <p:style>
-          <a:lnRef idx="2">
-            <a:schemeClr val="accent1">
-              <a:shade val="50000"/>
-            </a:schemeClr>
-          </a:lnRef>
-          <a:fillRef idx="1">
-            <a:schemeClr val="accent1"/>
-          </a:fillRef>
-          <a:effectRef idx="0">
-            <a:schemeClr val="accent1"/>
-          </a:effectRef>
-          <a:fontRef idx="minor">
-            <a:schemeClr val="lt1"/>
-          </a:fontRef>
-        </p:style>
-        <p:txBody>
-          <a:bodyPr rtlCol="0" anchor="ctr"/>
-          <a:lstStyle/>
-          <a:p>
-            <a:pPr algn="ctr"/>
-            <a:endParaRPr lang="en-US"/>
-          </a:p>
-        </p:txBody>
-      </p:sp>
-    </p:spTree>
-    <p:extLst>
-      <p:ext uri="{BB962C8B-B14F-4D97-AF65-F5344CB8AC3E}">
-        <p14:creationId xmlns:p14="http://schemas.microsoft.com/office/powerpoint/2010/main" val="2215448845"/>
-      </p:ext>
-    </p:extLst>
-  </p:cSld>
-  <p:clrMapOvr>
-    <a:masterClrMapping/>
-  </p:clrMapOvr>
-</p:sld>
-</file>
-
-<file path=ppt/slides/slide8.xml><?xml version="1.0" encoding="utf-8"?>
-<p:sld xmlns:a="http://schemas.openxmlformats.org/drawingml/2006/main" xmlns:r="http://schemas.openxmlformats.org/officeDocument/2006/relationships" xmlns:p="http://schemas.openxmlformats.org/presentationml/2006/main">
-  <p:cSld>
-    <p:spTree>
-      <p:nvGrpSpPr>
-        <p:cNvPr id="1" name=""/>
-        <p:cNvGrpSpPr/>
-        <p:nvPr/>
-      </p:nvGrpSpPr>
-      <p:grpSpPr>
-        <a:xfrm>
-          <a:off x="0" y="0"/>
-          <a:ext cx="0" cy="0"/>
-          <a:chOff x="0" y="0"/>
-          <a:chExt cx="0" cy="0"/>
-        </a:xfrm>
-      </p:grpSpPr>
-      <p:sp>
-        <p:nvSpPr>
-          <p:cNvPr id="2" name="Title 1">
-            <a:extLst>
-              <a:ext uri="{FF2B5EF4-FFF2-40B4-BE49-F238E27FC236}">
-                <a16:creationId xmlns:a16="http://schemas.microsoft.com/office/drawing/2014/main" id="{A4536007-94E5-4C78-8F8E-12FD6FC67A92}"/>
-              </a:ext>
-            </a:extLst>
-          </p:cNvPr>
-          <p:cNvSpPr>
-            <a:spLocks noGrp="1"/>
-          </p:cNvSpPr>
-          <p:nvPr>
-            <p:ph type="title"/>
-          </p:nvPr>
-        </p:nvSpPr>
-        <p:spPr/>
-        <p:txBody>
-          <a:bodyPr/>
-          <a:lstStyle/>
-          <a:p>
-            <a:r>
-              <a:rPr lang="en-US" dirty="0"/>
-              <a:t>View print log</a:t>
-            </a:r>
-          </a:p>
-        </p:txBody>
-      </p:sp>
-      <p:sp>
-        <p:nvSpPr>
-          <p:cNvPr id="3" name="Content Placeholder 2">
-            <a:extLst>
-              <a:ext uri="{FF2B5EF4-FFF2-40B4-BE49-F238E27FC236}">
-                <a16:creationId xmlns:a16="http://schemas.microsoft.com/office/drawing/2014/main" id="{B7D593D7-C61E-4F6E-ABD6-663DF502875E}"/>
-              </a:ext>
-            </a:extLst>
-          </p:cNvPr>
-          <p:cNvSpPr>
-            <a:spLocks noGrp="1"/>
-          </p:cNvSpPr>
-          <p:nvPr>
-            <p:ph idx="1"/>
-          </p:nvPr>
-        </p:nvSpPr>
-        <p:spPr>
-          <a:xfrm>
-            <a:off x="838200" y="1443886"/>
-            <a:ext cx="10515600" cy="4351338"/>
-          </a:xfrm>
-        </p:spPr>
-        <p:txBody>
-          <a:bodyPr/>
-          <a:lstStyle/>
-          <a:p>
-            <a:r>
-              <a:rPr lang="en-US" dirty="0"/>
-              <a:t>Use terminal as </a:t>
-            </a:r>
-            <a:r>
-              <a:rPr lang="en-US" dirty="0" err="1"/>
-              <a:t>TeraTerm</a:t>
-            </a:r>
-            <a:r>
-              <a:rPr lang="en-US" dirty="0"/>
-              <a:t> (baud rate = 115200) to see log </a:t>
-            </a:r>
-          </a:p>
-          <a:p>
-            <a:endParaRPr lang="en-US" sz="3600" dirty="0"/>
-          </a:p>
-          <a:p>
-            <a:endParaRPr lang="en-US" sz="3600" dirty="0"/>
-          </a:p>
-          <a:p>
-            <a:endParaRPr lang="en-US" sz="3600" dirty="0"/>
-          </a:p>
-          <a:p>
-            <a:pPr marL="0" indent="0">
-              <a:buNone/>
-            </a:pPr>
-            <a:endParaRPr lang="en-US" sz="1800" dirty="0"/>
-          </a:p>
-          <a:p>
-            <a:r>
-              <a:rPr lang="en-US" dirty="0"/>
-              <a:t>You can compare to normal case in the </a:t>
-            </a:r>
-            <a:r>
-              <a:rPr lang="en-US" dirty="0">
-                <a:solidFill>
-                  <a:srgbClr val="FF0000"/>
-                </a:solidFill>
-              </a:rPr>
-              <a:t>demo.log</a:t>
-            </a:r>
-            <a:r>
-              <a:rPr lang="en-US" dirty="0"/>
-              <a:t> file</a:t>
-            </a:r>
-          </a:p>
-        </p:txBody>
-      </p:sp>
-      <p:pic>
-        <p:nvPicPr>
-          <p:cNvPr id="4" name="Picture 3">
-            <a:extLst>
-              <a:ext uri="{FF2B5EF4-FFF2-40B4-BE49-F238E27FC236}">
-                <a16:creationId xmlns:a16="http://schemas.microsoft.com/office/drawing/2014/main" id="{B036CB0A-3213-48AC-9B60-E6D861E26C17}"/>
-              </a:ext>
-            </a:extLst>
-          </p:cNvPr>
-          <p:cNvPicPr>
-            <a:picLocks noChangeAspect="1"/>
-          </p:cNvPicPr>
-          <p:nvPr/>
-        </p:nvPicPr>
-        <p:blipFill>
-          <a:blip r:embed="rId2"/>
-          <a:stretch>
-            <a:fillRect/>
-          </a:stretch>
-        </p:blipFill>
-        <p:spPr>
-          <a:xfrm>
-            <a:off x="3639845" y="1970780"/>
-            <a:ext cx="4266895" cy="2152961"/>
-          </a:xfrm>
-          <a:prstGeom prst="rect">
-            <a:avLst/>
-          </a:prstGeom>
-        </p:spPr>
-      </p:pic>
-      <p:pic>
-        <p:nvPicPr>
-          <p:cNvPr id="5" name="Picture 4">
-            <a:extLst>
-              <a:ext uri="{FF2B5EF4-FFF2-40B4-BE49-F238E27FC236}">
-                <a16:creationId xmlns:a16="http://schemas.microsoft.com/office/drawing/2014/main" id="{9DEC4720-702F-43B7-89DB-1246BF5B8325}"/>
-              </a:ext>
-            </a:extLst>
-          </p:cNvPr>
-          <p:cNvPicPr>
-            <a:picLocks noChangeAspect="1"/>
-          </p:cNvPicPr>
-          <p:nvPr/>
-        </p:nvPicPr>
-        <p:blipFill>
-          <a:blip r:embed="rId3"/>
-          <a:stretch>
-            <a:fillRect/>
-          </a:stretch>
-        </p:blipFill>
-        <p:spPr>
-          <a:xfrm>
-            <a:off x="3639845" y="4827681"/>
-            <a:ext cx="4204042" cy="967543"/>
-          </a:xfrm>
-          <a:prstGeom prst="rect">
-            <a:avLst/>
-          </a:prstGeom>
-        </p:spPr>
-      </p:pic>
-    </p:spTree>
-    <p:extLst>
-      <p:ext uri="{BB962C8B-B14F-4D97-AF65-F5344CB8AC3E}">
-        <p14:creationId xmlns:p14="http://schemas.microsoft.com/office/powerpoint/2010/main" val="780682194"/>
       </p:ext>
     </p:extLst>
   </p:cSld>

</xml_diff>